<commit_message>
Modify first draft based on feedback
</commit_message>
<xml_diff>
--- a/initial_presentation.pptx
+++ b/initial_presentation.pptx
@@ -21,16 +21,18 @@
     <p:sldId id="266" r:id="rId15"/>
     <p:sldId id="267" r:id="rId16"/>
     <p:sldId id="268" r:id="rId17"/>
+    <p:sldId id="269" r:id="rId18"/>
+    <p:sldId id="270" r:id="rId19"/>
   </p:sldIdLst>
   <p:sldSz cy="5143500" cx="9144000"/>
   <p:notesSz cx="6858000" cy="9144000"/>
   <p:embeddedFontLst>
     <p:embeddedFont>
       <p:font typeface="Roboto"/>
-      <p:regular r:id="rId18"/>
-      <p:bold r:id="rId19"/>
-      <p:italic r:id="rId20"/>
-      <p:boldItalic r:id="rId21"/>
+      <p:regular r:id="rId20"/>
+      <p:bold r:id="rId21"/>
+      <p:italic r:id="rId22"/>
+      <p:boldItalic r:id="rId23"/>
     </p:embeddedFont>
   </p:embeddedFontLst>
   <p:defaultTextStyle>
@@ -487,7 +489,7 @@
   <p:cSld>
     <p:spTree>
       <p:nvGrpSpPr>
-        <p:cNvPr id="123" name="Shape 123"/>
+        <p:cNvPr id="125" name="Shape 125"/>
         <p:cNvGrpSpPr/>
         <p:nvPr/>
       </p:nvGrpSpPr>
@@ -501,7 +503,7 @@
       </p:grpSpPr>
       <p:sp>
         <p:nvSpPr>
-          <p:cNvPr id="124" name="Shape 124"/>
+          <p:cNvPr id="126" name="Shape 126"/>
           <p:cNvSpPr/>
           <p:nvPr>
             <p:ph idx="2" type="sldImg"/>
@@ -535,7 +537,7 @@
       </p:sp>
       <p:sp>
         <p:nvSpPr>
-          <p:cNvPr id="125" name="Shape 125"/>
+          <p:cNvPr id="127" name="Shape 127"/>
           <p:cNvSpPr txBox="1"/>
           <p:nvPr>
             <p:ph idx="1" type="body"/>
@@ -582,7 +584,7 @@
   <p:cSld>
     <p:spTree>
       <p:nvGrpSpPr>
-        <p:cNvPr id="129" name="Shape 129"/>
+        <p:cNvPr id="138" name="Shape 138"/>
         <p:cNvGrpSpPr/>
         <p:nvPr/>
       </p:nvGrpSpPr>
@@ -596,7 +598,7 @@
       </p:grpSpPr>
       <p:sp>
         <p:nvSpPr>
-          <p:cNvPr id="130" name="Shape 130"/>
+          <p:cNvPr id="139" name="Shape 139"/>
           <p:cNvSpPr/>
           <p:nvPr>
             <p:ph idx="2" type="sldImg"/>
@@ -630,7 +632,7 @@
       </p:sp>
       <p:sp>
         <p:nvSpPr>
-          <p:cNvPr id="131" name="Shape 131"/>
+          <p:cNvPr id="140" name="Shape 140"/>
           <p:cNvSpPr txBox="1"/>
           <p:nvPr>
             <p:ph idx="1" type="body"/>
@@ -677,7 +679,7 @@
   <p:cSld>
     <p:spTree>
       <p:nvGrpSpPr>
-        <p:cNvPr id="135" name="Shape 135"/>
+        <p:cNvPr id="151" name="Shape 151"/>
         <p:cNvGrpSpPr/>
         <p:nvPr/>
       </p:nvGrpSpPr>
@@ -691,7 +693,7 @@
       </p:grpSpPr>
       <p:sp>
         <p:nvSpPr>
-          <p:cNvPr id="136" name="Shape 136"/>
+          <p:cNvPr id="152" name="Shape 152"/>
           <p:cNvSpPr/>
           <p:nvPr>
             <p:ph idx="2" type="sldImg"/>
@@ -725,7 +727,7 @@
       </p:sp>
       <p:sp>
         <p:nvSpPr>
-          <p:cNvPr id="137" name="Shape 137"/>
+          <p:cNvPr id="153" name="Shape 153"/>
           <p:cNvSpPr txBox="1"/>
           <p:nvPr>
             <p:ph idx="1" type="body"/>
@@ -752,10 +754,9 @@
               </a:spcBef>
               <a:buNone/>
             </a:pPr>
-            <a:r>
-              <a:t/>
-            </a:r>
-            <a:endParaRPr/>
+            <a:br>
+              <a:rPr lang="en"/>
+            </a:br>
           </a:p>
         </p:txBody>
       </p:sp>
@@ -772,7 +773,7 @@
   <p:cSld>
     <p:spTree>
       <p:nvGrpSpPr>
-        <p:cNvPr id="141" name="Shape 141"/>
+        <p:cNvPr id="157" name="Shape 157"/>
         <p:cNvGrpSpPr/>
         <p:nvPr/>
       </p:nvGrpSpPr>
@@ -786,7 +787,7 @@
       </p:grpSpPr>
       <p:sp>
         <p:nvSpPr>
-          <p:cNvPr id="142" name="Shape 142"/>
+          <p:cNvPr id="158" name="Shape 158"/>
           <p:cNvSpPr/>
           <p:nvPr>
             <p:ph idx="2" type="sldImg"/>
@@ -820,7 +821,197 @@
       </p:sp>
       <p:sp>
         <p:nvSpPr>
-          <p:cNvPr id="143" name="Shape 143"/>
+          <p:cNvPr id="159" name="Shape 159"/>
+          <p:cNvSpPr txBox="1"/>
+          <p:nvPr>
+            <p:ph idx="1" type="body"/>
+          </p:nvPr>
+        </p:nvSpPr>
+        <p:spPr>
+          <a:xfrm>
+            <a:off x="685800" y="4343400"/>
+            <a:ext cx="5486400" cy="4114800"/>
+          </a:xfrm>
+          <a:prstGeom prst="rect">
+            <a:avLst/>
+          </a:prstGeom>
+        </p:spPr>
+        <p:txBody>
+          <a:bodyPr anchorCtr="0" anchor="t" bIns="91425" lIns="91425" rIns="91425" tIns="91425">
+            <a:noAutofit/>
+          </a:bodyPr>
+          <a:lstStyle/>
+          <a:p>
+            <a:pPr lvl="0" rtl="0">
+              <a:spcBef>
+                <a:spcPts val="0"/>
+              </a:spcBef>
+              <a:buNone/>
+            </a:pPr>
+            <a:r>
+              <a:t/>
+            </a:r>
+            <a:endParaRPr/>
+          </a:p>
+        </p:txBody>
+      </p:sp>
+    </p:spTree>
+  </p:cSld>
+  <p:clrMapOvr>
+    <a:masterClrMapping/>
+  </p:clrMapOvr>
+</p:notes>
+</file>
+
+<file path=ppt/notesSlides/notesSlide14.xml><?xml version="1.0" encoding="utf-8"?>
+<p:notes xmlns:a="http://schemas.openxmlformats.org/drawingml/2006/main" xmlns:r="http://schemas.openxmlformats.org/officeDocument/2006/relationships" xmlns:mc="http://schemas.openxmlformats.org/markup-compatibility/2006" xmlns:mv="urn:schemas-microsoft-com:mac:vml" xmlns:p="http://schemas.openxmlformats.org/presentationml/2006/main" xmlns:c="http://schemas.openxmlformats.org/drawingml/2006/chart" xmlns:dgm="http://schemas.openxmlformats.org/drawingml/2006/diagram" xmlns:o="urn:schemas-microsoft-com:office:office" xmlns:v="urn:schemas-microsoft-com:vml" xmlns:pvml="urn:schemas-microsoft-com:office:powerpoint" xmlns:com="http://schemas.openxmlformats.org/drawingml/2006/compatibility" xmlns:p14="http://schemas.microsoft.com/office/powerpoint/2010/main" showMasterPhAnim="0" showMasterSp="0">
+  <p:cSld>
+    <p:spTree>
+      <p:nvGrpSpPr>
+        <p:cNvPr id="163" name="Shape 163"/>
+        <p:cNvGrpSpPr/>
+        <p:nvPr/>
+      </p:nvGrpSpPr>
+      <p:grpSpPr>
+        <a:xfrm>
+          <a:off x="0" y="0"/>
+          <a:ext cx="0" cy="0"/>
+          <a:chOff x="0" y="0"/>
+          <a:chExt cx="0" cy="0"/>
+        </a:xfrm>
+      </p:grpSpPr>
+      <p:sp>
+        <p:nvSpPr>
+          <p:cNvPr id="164" name="Shape 164"/>
+          <p:cNvSpPr/>
+          <p:nvPr>
+            <p:ph idx="2" type="sldImg"/>
+          </p:nvPr>
+        </p:nvSpPr>
+        <p:spPr>
+          <a:xfrm>
+            <a:off x="381300" y="685800"/>
+            <a:ext cx="6096000" cy="3429000"/>
+          </a:xfrm>
+          <a:custGeom>
+            <a:pathLst>
+              <a:path extrusionOk="0" h="120000" w="120000">
+                <a:moveTo>
+                  <a:pt x="0" y="0"/>
+                </a:moveTo>
+                <a:lnTo>
+                  <a:pt x="120000" y="0"/>
+                </a:lnTo>
+                <a:lnTo>
+                  <a:pt x="120000" y="120000"/>
+                </a:lnTo>
+                <a:lnTo>
+                  <a:pt x="0" y="120000"/>
+                </a:lnTo>
+                <a:close/>
+              </a:path>
+            </a:pathLst>
+          </a:custGeom>
+        </p:spPr>
+      </p:sp>
+      <p:sp>
+        <p:nvSpPr>
+          <p:cNvPr id="165" name="Shape 165"/>
+          <p:cNvSpPr txBox="1"/>
+          <p:nvPr>
+            <p:ph idx="1" type="body"/>
+          </p:nvPr>
+        </p:nvSpPr>
+        <p:spPr>
+          <a:xfrm>
+            <a:off x="685800" y="4343400"/>
+            <a:ext cx="5486400" cy="4114800"/>
+          </a:xfrm>
+          <a:prstGeom prst="rect">
+            <a:avLst/>
+          </a:prstGeom>
+        </p:spPr>
+        <p:txBody>
+          <a:bodyPr anchorCtr="0" anchor="t" bIns="91425" lIns="91425" rIns="91425" tIns="91425">
+            <a:noAutofit/>
+          </a:bodyPr>
+          <a:lstStyle/>
+          <a:p>
+            <a:pPr lvl="0" rtl="0">
+              <a:spcBef>
+                <a:spcPts val="0"/>
+              </a:spcBef>
+              <a:buNone/>
+            </a:pPr>
+            <a:r>
+              <a:t/>
+            </a:r>
+            <a:endParaRPr/>
+          </a:p>
+        </p:txBody>
+      </p:sp>
+    </p:spTree>
+  </p:cSld>
+  <p:clrMapOvr>
+    <a:masterClrMapping/>
+  </p:clrMapOvr>
+</p:notes>
+</file>
+
+<file path=ppt/notesSlides/notesSlide15.xml><?xml version="1.0" encoding="utf-8"?>
+<p:notes xmlns:a="http://schemas.openxmlformats.org/drawingml/2006/main" xmlns:r="http://schemas.openxmlformats.org/officeDocument/2006/relationships" xmlns:mc="http://schemas.openxmlformats.org/markup-compatibility/2006" xmlns:mv="urn:schemas-microsoft-com:mac:vml" xmlns:p="http://schemas.openxmlformats.org/presentationml/2006/main" xmlns:c="http://schemas.openxmlformats.org/drawingml/2006/chart" xmlns:dgm="http://schemas.openxmlformats.org/drawingml/2006/diagram" xmlns:o="urn:schemas-microsoft-com:office:office" xmlns:v="urn:schemas-microsoft-com:vml" xmlns:pvml="urn:schemas-microsoft-com:office:powerpoint" xmlns:com="http://schemas.openxmlformats.org/drawingml/2006/compatibility" xmlns:p14="http://schemas.microsoft.com/office/powerpoint/2010/main" showMasterPhAnim="0" showMasterSp="0">
+  <p:cSld>
+    <p:spTree>
+      <p:nvGrpSpPr>
+        <p:cNvPr id="169" name="Shape 169"/>
+        <p:cNvGrpSpPr/>
+        <p:nvPr/>
+      </p:nvGrpSpPr>
+      <p:grpSpPr>
+        <a:xfrm>
+          <a:off x="0" y="0"/>
+          <a:ext cx="0" cy="0"/>
+          <a:chOff x="0" y="0"/>
+          <a:chExt cx="0" cy="0"/>
+        </a:xfrm>
+      </p:grpSpPr>
+      <p:sp>
+        <p:nvSpPr>
+          <p:cNvPr id="170" name="Shape 170"/>
+          <p:cNvSpPr/>
+          <p:nvPr>
+            <p:ph idx="2" type="sldImg"/>
+          </p:nvPr>
+        </p:nvSpPr>
+        <p:spPr>
+          <a:xfrm>
+            <a:off x="381300" y="685800"/>
+            <a:ext cx="6096000" cy="3429000"/>
+          </a:xfrm>
+          <a:custGeom>
+            <a:pathLst>
+              <a:path extrusionOk="0" h="120000" w="120000">
+                <a:moveTo>
+                  <a:pt x="0" y="0"/>
+                </a:moveTo>
+                <a:lnTo>
+                  <a:pt x="120000" y="0"/>
+                </a:lnTo>
+                <a:lnTo>
+                  <a:pt x="120000" y="120000"/>
+                </a:lnTo>
+                <a:lnTo>
+                  <a:pt x="0" y="120000"/>
+                </a:lnTo>
+                <a:close/>
+              </a:path>
+            </a:pathLst>
+          </a:custGeom>
+        </p:spPr>
+      </p:sp>
+      <p:sp>
+        <p:nvSpPr>
+          <p:cNvPr id="171" name="Shape 171"/>
           <p:cNvSpPr txBox="1"/>
           <p:nvPr>
             <p:ph idx="1" type="body"/>
@@ -1221,7 +1412,7 @@
           </a:bodyPr>
           <a:lstStyle/>
           <a:p>
-            <a:pPr lvl="0">
+            <a:pPr lvl="0" rtl="0">
               <a:spcBef>
                 <a:spcPts val="0"/>
               </a:spcBef>
@@ -1247,7 +1438,7 @@
   <p:cSld>
     <p:spTree>
       <p:nvGrpSpPr>
-        <p:cNvPr id="94" name="Shape 94"/>
+        <p:cNvPr id="101" name="Shape 101"/>
         <p:cNvGrpSpPr/>
         <p:nvPr/>
       </p:nvGrpSpPr>
@@ -1261,7 +1452,7 @@
       </p:grpSpPr>
       <p:sp>
         <p:nvSpPr>
-          <p:cNvPr id="95" name="Shape 95"/>
+          <p:cNvPr id="102" name="Shape 102"/>
           <p:cNvSpPr/>
           <p:nvPr>
             <p:ph idx="2" type="sldImg"/>
@@ -1295,7 +1486,7 @@
       </p:sp>
       <p:sp>
         <p:nvSpPr>
-          <p:cNvPr id="96" name="Shape 96"/>
+          <p:cNvPr id="103" name="Shape 103"/>
           <p:cNvSpPr txBox="1"/>
           <p:nvPr>
             <p:ph idx="1" type="body"/>
@@ -1316,7 +1507,7 @@
           </a:bodyPr>
           <a:lstStyle/>
           <a:p>
-            <a:pPr lvl="0" rtl="0">
+            <a:pPr lvl="0">
               <a:spcBef>
                 <a:spcPts val="0"/>
               </a:spcBef>
@@ -1342,7 +1533,7 @@
   <p:cSld>
     <p:spTree>
       <p:nvGrpSpPr>
-        <p:cNvPr id="100" name="Shape 100"/>
+        <p:cNvPr id="107" name="Shape 107"/>
         <p:cNvGrpSpPr/>
         <p:nvPr/>
       </p:nvGrpSpPr>
@@ -1356,7 +1547,7 @@
       </p:grpSpPr>
       <p:sp>
         <p:nvSpPr>
-          <p:cNvPr id="101" name="Shape 101"/>
+          <p:cNvPr id="108" name="Shape 108"/>
           <p:cNvSpPr/>
           <p:nvPr>
             <p:ph idx="2" type="sldImg"/>
@@ -1390,7 +1581,7 @@
       </p:sp>
       <p:sp>
         <p:nvSpPr>
-          <p:cNvPr id="102" name="Shape 102"/>
+          <p:cNvPr id="109" name="Shape 109"/>
           <p:cNvSpPr txBox="1"/>
           <p:nvPr>
             <p:ph idx="1" type="body"/>
@@ -1437,7 +1628,7 @@
   <p:cSld>
     <p:spTree>
       <p:nvGrpSpPr>
-        <p:cNvPr id="106" name="Shape 106"/>
+        <p:cNvPr id="113" name="Shape 113"/>
         <p:cNvGrpSpPr/>
         <p:nvPr/>
       </p:nvGrpSpPr>
@@ -1451,7 +1642,7 @@
       </p:grpSpPr>
       <p:sp>
         <p:nvSpPr>
-          <p:cNvPr id="107" name="Shape 107"/>
+          <p:cNvPr id="114" name="Shape 114"/>
           <p:cNvSpPr/>
           <p:nvPr>
             <p:ph idx="2" type="sldImg"/>
@@ -1485,7 +1676,7 @@
       </p:sp>
       <p:sp>
         <p:nvSpPr>
-          <p:cNvPr id="108" name="Shape 108"/>
+          <p:cNvPr id="115" name="Shape 115"/>
           <p:cNvSpPr txBox="1"/>
           <p:nvPr>
             <p:ph idx="1" type="body"/>
@@ -1532,7 +1723,7 @@
   <p:cSld>
     <p:spTree>
       <p:nvGrpSpPr>
-        <p:cNvPr id="112" name="Shape 112"/>
+        <p:cNvPr id="119" name="Shape 119"/>
         <p:cNvGrpSpPr/>
         <p:nvPr/>
       </p:nvGrpSpPr>
@@ -1546,7 +1737,7 @@
       </p:grpSpPr>
       <p:sp>
         <p:nvSpPr>
-          <p:cNvPr id="113" name="Shape 113"/>
+          <p:cNvPr id="120" name="Shape 120"/>
           <p:cNvSpPr/>
           <p:nvPr>
             <p:ph idx="2" type="sldImg"/>
@@ -1580,7 +1771,7 @@
       </p:sp>
       <p:sp>
         <p:nvSpPr>
-          <p:cNvPr id="114" name="Shape 114"/>
+          <p:cNvPr id="121" name="Shape 121"/>
           <p:cNvSpPr txBox="1"/>
           <p:nvPr>
             <p:ph idx="1" type="body"/>
@@ -6076,7 +6267,7 @@
   <p:cSld>
     <p:spTree>
       <p:nvGrpSpPr>
-        <p:cNvPr id="126" name="Shape 126"/>
+        <p:cNvPr id="128" name="Shape 128"/>
         <p:cNvGrpSpPr/>
         <p:nvPr/>
       </p:nvGrpSpPr>
@@ -6090,7 +6281,7 @@
       </p:grpSpPr>
       <p:sp>
         <p:nvSpPr>
-          <p:cNvPr id="127" name="Shape 127"/>
+          <p:cNvPr id="129" name="Shape 129"/>
           <p:cNvSpPr txBox="1"/>
           <p:nvPr>
             <p:ph type="title"/>
@@ -6119,27 +6310,292 @@
             </a:pPr>
             <a:r>
               <a:rPr lang="en"/>
-              <a:t>Motivations (1)</a:t>
-            </a:r>
-          </a:p>
-        </p:txBody>
-      </p:sp>
-      <p:sp>
-        <p:nvSpPr>
-          <p:cNvPr id="128" name="Shape 128"/>
+              <a:t>Tomcat Native</a:t>
+            </a:r>
+          </a:p>
+        </p:txBody>
+      </p:sp>
+      <p:sp>
+        <p:nvSpPr>
+          <p:cNvPr id="130" name="Shape 130"/>
+          <p:cNvSpPr/>
+          <p:nvPr/>
+        </p:nvSpPr>
+        <p:spPr>
+          <a:xfrm>
+            <a:off x="5021862" y="2505825"/>
+            <a:ext cx="1736400" cy="648300"/>
+          </a:xfrm>
+          <a:prstGeom prst="rect">
+            <a:avLst/>
+          </a:prstGeom>
+          <a:solidFill>
+            <a:schemeClr val="accent5"/>
+          </a:solidFill>
+          <a:ln>
+            <a:noFill/>
+          </a:ln>
+        </p:spPr>
+        <p:txBody>
+          <a:bodyPr anchorCtr="0" anchor="ctr" bIns="91425" lIns="91425" rIns="91425" tIns="91425">
+            <a:noAutofit/>
+          </a:bodyPr>
+          <a:lstStyle/>
+          <a:p>
+            <a:pPr lvl="0" rtl="0" algn="ctr">
+              <a:spcBef>
+                <a:spcPts val="0"/>
+              </a:spcBef>
+              <a:buNone/>
+            </a:pPr>
+            <a:r>
+              <a:rPr lang="en">
+                <a:solidFill>
+                  <a:schemeClr val="lt1"/>
+                </a:solidFill>
+              </a:rPr>
+              <a:t>Undertow</a:t>
+            </a:r>
+          </a:p>
+        </p:txBody>
+      </p:sp>
+      <p:sp>
+        <p:nvSpPr>
+          <p:cNvPr id="131" name="Shape 131"/>
+          <p:cNvSpPr/>
+          <p:nvPr/>
+        </p:nvSpPr>
+        <p:spPr>
+          <a:xfrm>
+            <a:off x="2407637" y="2505825"/>
+            <a:ext cx="1736400" cy="648300"/>
+          </a:xfrm>
+          <a:prstGeom prst="rect">
+            <a:avLst/>
+          </a:prstGeom>
+          <a:solidFill>
+            <a:schemeClr val="accent5"/>
+          </a:solidFill>
+          <a:ln>
+            <a:noFill/>
+          </a:ln>
+        </p:spPr>
+        <p:txBody>
+          <a:bodyPr anchorCtr="0" anchor="ctr" bIns="91425" lIns="91425" rIns="91425" tIns="91425">
+            <a:noAutofit/>
+          </a:bodyPr>
+          <a:lstStyle/>
+          <a:p>
+            <a:pPr lvl="0" rtl="0" algn="ctr">
+              <a:spcBef>
+                <a:spcPts val="0"/>
+              </a:spcBef>
+              <a:buNone/>
+            </a:pPr>
+            <a:r>
+              <a:rPr lang="en">
+                <a:solidFill>
+                  <a:schemeClr val="lt1"/>
+                </a:solidFill>
+              </a:rPr>
+              <a:t>Tomcat</a:t>
+            </a:r>
+          </a:p>
+        </p:txBody>
+      </p:sp>
+      <p:sp>
+        <p:nvSpPr>
+          <p:cNvPr id="132" name="Shape 132"/>
+          <p:cNvSpPr/>
+          <p:nvPr/>
+        </p:nvSpPr>
+        <p:spPr>
+          <a:xfrm>
+            <a:off x="2407637" y="3878750"/>
+            <a:ext cx="1736400" cy="648300"/>
+          </a:xfrm>
+          <a:prstGeom prst="rect">
+            <a:avLst/>
+          </a:prstGeom>
+          <a:solidFill>
+            <a:schemeClr val="accent1"/>
+          </a:solidFill>
+          <a:ln>
+            <a:noFill/>
+          </a:ln>
+        </p:spPr>
+        <p:txBody>
+          <a:bodyPr anchorCtr="0" anchor="ctr" bIns="91425" lIns="91425" rIns="91425" tIns="91425">
+            <a:noAutofit/>
+          </a:bodyPr>
+          <a:lstStyle/>
+          <a:p>
+            <a:pPr lvl="0" rtl="0" algn="ctr">
+              <a:spcBef>
+                <a:spcPts val="0"/>
+              </a:spcBef>
+              <a:buNone/>
+            </a:pPr>
+            <a:r>
+              <a:rPr lang="en">
+                <a:solidFill>
+                  <a:schemeClr val="lt1"/>
+                </a:solidFill>
+              </a:rPr>
+              <a:t>tc-native</a:t>
+            </a:r>
+          </a:p>
+        </p:txBody>
+      </p:sp>
+      <p:sp>
+        <p:nvSpPr>
+          <p:cNvPr id="133" name="Shape 133"/>
+          <p:cNvSpPr/>
+          <p:nvPr/>
+        </p:nvSpPr>
+        <p:spPr>
+          <a:xfrm>
+            <a:off x="5021862" y="3878750"/>
+            <a:ext cx="1736400" cy="648300"/>
+          </a:xfrm>
+          <a:prstGeom prst="rect">
+            <a:avLst/>
+          </a:prstGeom>
+          <a:solidFill>
+            <a:schemeClr val="accent1"/>
+          </a:solidFill>
+          <a:ln>
+            <a:noFill/>
+          </a:ln>
+        </p:spPr>
+        <p:txBody>
+          <a:bodyPr anchorCtr="0" anchor="ctr" bIns="91425" lIns="91425" rIns="91425" tIns="91425">
+            <a:noAutofit/>
+          </a:bodyPr>
+          <a:lstStyle/>
+          <a:p>
+            <a:pPr lvl="0" rtl="0" algn="ctr">
+              <a:spcBef>
+                <a:spcPts val="0"/>
+              </a:spcBef>
+              <a:buNone/>
+            </a:pPr>
+            <a:r>
+              <a:rPr lang="en">
+                <a:solidFill>
+                  <a:schemeClr val="lt1"/>
+                </a:solidFill>
+              </a:rPr>
+              <a:t>JSSE</a:t>
+            </a:r>
+          </a:p>
+        </p:txBody>
+      </p:sp>
+      <p:cxnSp>
+        <p:nvCxnSpPr>
+          <p:cNvPr id="134" name="Shape 134"/>
+          <p:cNvCxnSpPr>
+            <a:stCxn id="133" idx="0"/>
+            <a:endCxn id="130" idx="2"/>
+          </p:cNvCxnSpPr>
+          <p:nvPr/>
+        </p:nvCxnSpPr>
+        <p:spPr>
+          <a:xfrm rot="10800000">
+            <a:off x="5890062" y="3154250"/>
+            <a:ext cx="0" cy="724500"/>
+          </a:xfrm>
+          <a:prstGeom prst="straightConnector1">
+            <a:avLst/>
+          </a:prstGeom>
+          <a:noFill/>
+          <a:ln cap="flat" cmpd="sng" w="9525">
+            <a:solidFill>
+              <a:schemeClr val="dk2"/>
+            </a:solidFill>
+            <a:prstDash val="solid"/>
+            <a:round/>
+            <a:headEnd len="lg" w="lg" type="none"/>
+            <a:tailEnd len="lg" w="lg" type="triangle"/>
+          </a:ln>
+        </p:spPr>
+      </p:cxnSp>
+      <p:cxnSp>
+        <p:nvCxnSpPr>
+          <p:cNvPr id="135" name="Shape 135"/>
+          <p:cNvCxnSpPr>
+            <a:stCxn id="133" idx="0"/>
+            <a:endCxn id="131" idx="2"/>
+          </p:cNvCxnSpPr>
+          <p:nvPr/>
+        </p:nvCxnSpPr>
+        <p:spPr>
+          <a:xfrm rot="10800000">
+            <a:off x="3275862" y="3154250"/>
+            <a:ext cx="2614200" cy="724500"/>
+          </a:xfrm>
+          <a:prstGeom prst="straightConnector1">
+            <a:avLst/>
+          </a:prstGeom>
+          <a:noFill/>
+          <a:ln cap="flat" cmpd="sng" w="9525">
+            <a:solidFill>
+              <a:schemeClr val="dk2"/>
+            </a:solidFill>
+            <a:prstDash val="solid"/>
+            <a:round/>
+            <a:headEnd len="lg" w="lg" type="none"/>
+            <a:tailEnd len="lg" w="lg" type="triangle"/>
+          </a:ln>
+        </p:spPr>
+      </p:cxnSp>
+      <p:cxnSp>
+        <p:nvCxnSpPr>
+          <p:cNvPr id="136" name="Shape 136"/>
+          <p:cNvCxnSpPr>
+            <a:stCxn id="132" idx="0"/>
+            <a:endCxn id="131" idx="2"/>
+          </p:cNvCxnSpPr>
+          <p:nvPr/>
+        </p:nvCxnSpPr>
+        <p:spPr>
+          <a:xfrm rot="10800000">
+            <a:off x="3275837" y="3154250"/>
+            <a:ext cx="0" cy="724500"/>
+          </a:xfrm>
+          <a:prstGeom prst="straightConnector1">
+            <a:avLst/>
+          </a:prstGeom>
+          <a:noFill/>
+          <a:ln cap="flat" cmpd="sng" w="9525">
+            <a:solidFill>
+              <a:schemeClr val="dk2"/>
+            </a:solidFill>
+            <a:prstDash val="solid"/>
+            <a:round/>
+            <a:headEnd len="lg" w="lg" type="none"/>
+            <a:tailEnd len="lg" w="lg" type="triangle"/>
+          </a:ln>
+        </p:spPr>
+      </p:cxnSp>
+      <p:sp>
+        <p:nvSpPr>
+          <p:cNvPr id="137" name="Shape 137"/>
           <p:cNvSpPr txBox="1"/>
-          <p:nvPr>
-            <p:ph idx="1" type="body"/>
-          </p:nvPr>
-        </p:nvSpPr>
-        <p:spPr>
-          <a:xfrm>
-            <a:off x="471900" y="1919075"/>
-            <a:ext cx="8222100" cy="2710200"/>
-          </a:xfrm>
-          <a:prstGeom prst="rect">
-            <a:avLst/>
-          </a:prstGeom>
+          <p:nvPr/>
+        </p:nvSpPr>
+        <p:spPr>
+          <a:xfrm>
+            <a:off x="384675" y="1868375"/>
+            <a:ext cx="1538700" cy="738600"/>
+          </a:xfrm>
+          <a:prstGeom prst="rect">
+            <a:avLst/>
+          </a:prstGeom>
+          <a:noFill/>
+          <a:ln>
+            <a:noFill/>
+          </a:ln>
         </p:spPr>
         <p:txBody>
           <a:bodyPr anchorCtr="0" anchor="t" bIns="91425" lIns="91425" rIns="91425" tIns="91425">
@@ -6147,39 +6603,6 @@
           </a:bodyPr>
           <a:lstStyle/>
           <a:p>
-            <a:pPr indent="-228600" lvl="0" marL="457200" rtl="0">
-              <a:spcBef>
-                <a:spcPts val="0"/>
-              </a:spcBef>
-            </a:pPr>
-            <a:r>
-              <a:rPr lang="en"/>
-              <a:t>APR has a lot of C code and is hard to maintain</a:t>
-            </a:r>
-          </a:p>
-          <a:p>
-            <a:pPr indent="-228600" lvl="0" marL="457200" rtl="0">
-              <a:spcBef>
-                <a:spcPts val="0"/>
-              </a:spcBef>
-            </a:pPr>
-            <a:r>
-              <a:rPr lang="en"/>
-              <a:t>Undertow is using JSSE which performs poorly</a:t>
-            </a:r>
-          </a:p>
-          <a:p>
-            <a:pPr indent="-228600" lvl="0" marL="457200" rtl="0">
-              <a:spcBef>
-                <a:spcPts val="0"/>
-              </a:spcBef>
-            </a:pPr>
-            <a:r>
-              <a:rPr lang="en"/>
-              <a:t>OpenSSL is efficient, active and cross-platform</a:t>
-            </a:r>
-          </a:p>
-          <a:p>
             <a:pPr lvl="0" rtl="0">
               <a:spcBef>
                 <a:spcPts val="0"/>
@@ -6187,21 +6610,17 @@
               <a:buNone/>
             </a:pPr>
             <a:r>
-              <a:rPr lang="en"/>
-              <a:t>Using Undertow directly with OpenSSL should perform better and be easier to maintain</a:t>
-            </a:r>
-          </a:p>
-          <a:p>
-            <a:pPr lvl="0" rtl="0">
-              <a:spcBef>
-                <a:spcPts val="0"/>
-              </a:spcBef>
-              <a:buNone/>
-            </a:pPr>
-            <a:r>
-              <a:t/>
-            </a:r>
-            <a:endParaRPr/>
+              <a:rPr lang="en" sz="1800">
+                <a:solidFill>
+                  <a:schemeClr val="lt2"/>
+                </a:solidFill>
+                <a:latin typeface="Roboto"/>
+                <a:ea typeface="Roboto"/>
+                <a:cs typeface="Roboto"/>
+                <a:sym typeface="Roboto"/>
+              </a:rPr>
+              <a:t>Right Now :</a:t>
+            </a:r>
           </a:p>
         </p:txBody>
       </p:sp>
@@ -6221,7 +6640,7 @@
   <p:cSld>
     <p:spTree>
       <p:nvGrpSpPr>
-        <p:cNvPr id="132" name="Shape 132"/>
+        <p:cNvPr id="141" name="Shape 141"/>
         <p:cNvGrpSpPr/>
         <p:nvPr/>
       </p:nvGrpSpPr>
@@ -6235,7 +6654,7 @@
       </p:grpSpPr>
       <p:sp>
         <p:nvSpPr>
-          <p:cNvPr id="133" name="Shape 133"/>
+          <p:cNvPr id="142" name="Shape 142"/>
           <p:cNvSpPr txBox="1"/>
           <p:nvPr>
             <p:ph type="title"/>
@@ -6264,35 +6683,39 @@
             </a:pPr>
             <a:r>
               <a:rPr lang="en"/>
-              <a:t>Motivations (2)</a:t>
-            </a:r>
-          </a:p>
-        </p:txBody>
-      </p:sp>
-      <p:sp>
-        <p:nvSpPr>
-          <p:cNvPr id="134" name="Shape 134"/>
-          <p:cNvSpPr txBox="1"/>
-          <p:nvPr>
-            <p:ph idx="1" type="body"/>
-          </p:nvPr>
-        </p:nvSpPr>
-        <p:spPr>
-          <a:xfrm>
-            <a:off x="471900" y="1919075"/>
-            <a:ext cx="8222100" cy="2710200"/>
-          </a:xfrm>
-          <a:prstGeom prst="rect">
-            <a:avLst/>
-          </a:prstGeom>
-        </p:spPr>
-        <p:txBody>
-          <a:bodyPr anchorCtr="0" anchor="t" bIns="91425" lIns="91425" rIns="91425" tIns="91425">
+              <a:t>Project Goals (2)</a:t>
+            </a:r>
+          </a:p>
+        </p:txBody>
+      </p:sp>
+      <p:sp>
+        <p:nvSpPr>
+          <p:cNvPr id="143" name="Shape 143"/>
+          <p:cNvSpPr/>
+          <p:nvPr/>
+        </p:nvSpPr>
+        <p:spPr>
+          <a:xfrm>
+            <a:off x="5021862" y="2505825"/>
+            <a:ext cx="1736400" cy="648300"/>
+          </a:xfrm>
+          <a:prstGeom prst="rect">
+            <a:avLst/>
+          </a:prstGeom>
+          <a:solidFill>
+            <a:schemeClr val="accent5"/>
+          </a:solidFill>
+          <a:ln>
+            <a:noFill/>
+          </a:ln>
+        </p:spPr>
+        <p:txBody>
+          <a:bodyPr anchorCtr="0" anchor="ctr" bIns="91425" lIns="91425" rIns="91425" tIns="91425">
             <a:noAutofit/>
           </a:bodyPr>
           <a:lstStyle/>
           <a:p>
-            <a:pPr lvl="0" rtl="0">
+            <a:pPr lvl="0" rtl="0" algn="ctr">
               <a:spcBef>
                 <a:spcPts val="0"/>
               </a:spcBef>
@@ -6301,14 +6724,262 @@
             <a:r>
               <a:rPr lang="en">
                 <a:solidFill>
-                  <a:srgbClr val="FF0000"/>
+                  <a:schemeClr val="lt1"/>
                 </a:solidFill>
               </a:rPr>
-              <a:t>MAYBE ADD DIAGRAM THROUGHPUT DIFFERENT CONNECTORS</a:t>
-            </a:r>
-          </a:p>
-        </p:txBody>
-      </p:sp>
+              <a:t>Undertow</a:t>
+            </a:r>
+          </a:p>
+        </p:txBody>
+      </p:sp>
+      <p:sp>
+        <p:nvSpPr>
+          <p:cNvPr id="144" name="Shape 144"/>
+          <p:cNvSpPr/>
+          <p:nvPr/>
+        </p:nvSpPr>
+        <p:spPr>
+          <a:xfrm>
+            <a:off x="2407637" y="2505825"/>
+            <a:ext cx="1736400" cy="648300"/>
+          </a:xfrm>
+          <a:prstGeom prst="rect">
+            <a:avLst/>
+          </a:prstGeom>
+          <a:solidFill>
+            <a:schemeClr val="accent5"/>
+          </a:solidFill>
+          <a:ln>
+            <a:noFill/>
+          </a:ln>
+        </p:spPr>
+        <p:txBody>
+          <a:bodyPr anchorCtr="0" anchor="ctr" bIns="91425" lIns="91425" rIns="91425" tIns="91425">
+            <a:noAutofit/>
+          </a:bodyPr>
+          <a:lstStyle/>
+          <a:p>
+            <a:pPr lvl="0" rtl="0" algn="ctr">
+              <a:spcBef>
+                <a:spcPts val="0"/>
+              </a:spcBef>
+              <a:buNone/>
+            </a:pPr>
+            <a:r>
+              <a:rPr lang="en">
+                <a:solidFill>
+                  <a:schemeClr val="lt1"/>
+                </a:solidFill>
+              </a:rPr>
+              <a:t>Tomcat</a:t>
+            </a:r>
+          </a:p>
+        </p:txBody>
+      </p:sp>
+      <p:sp>
+        <p:nvSpPr>
+          <p:cNvPr id="145" name="Shape 145"/>
+          <p:cNvSpPr/>
+          <p:nvPr/>
+        </p:nvSpPr>
+        <p:spPr>
+          <a:xfrm>
+            <a:off x="2407637" y="3878750"/>
+            <a:ext cx="1736400" cy="648300"/>
+          </a:xfrm>
+          <a:prstGeom prst="rect">
+            <a:avLst/>
+          </a:prstGeom>
+          <a:solidFill>
+            <a:schemeClr val="accent1"/>
+          </a:solidFill>
+          <a:ln>
+            <a:noFill/>
+          </a:ln>
+        </p:spPr>
+        <p:txBody>
+          <a:bodyPr anchorCtr="0" anchor="ctr" bIns="91425" lIns="91425" rIns="91425" tIns="91425">
+            <a:noAutofit/>
+          </a:bodyPr>
+          <a:lstStyle/>
+          <a:p>
+            <a:pPr lvl="0" rtl="0" algn="ctr">
+              <a:spcBef>
+                <a:spcPts val="0"/>
+              </a:spcBef>
+              <a:buNone/>
+            </a:pPr>
+            <a:r>
+              <a:rPr lang="en">
+                <a:solidFill>
+                  <a:schemeClr val="lt1"/>
+                </a:solidFill>
+              </a:rPr>
+              <a:t>Subset of tc-native</a:t>
+            </a:r>
+          </a:p>
+        </p:txBody>
+      </p:sp>
+      <p:sp>
+        <p:nvSpPr>
+          <p:cNvPr id="146" name="Shape 146"/>
+          <p:cNvSpPr/>
+          <p:nvPr/>
+        </p:nvSpPr>
+        <p:spPr>
+          <a:xfrm>
+            <a:off x="5021862" y="3878750"/>
+            <a:ext cx="1736400" cy="648300"/>
+          </a:xfrm>
+          <a:prstGeom prst="rect">
+            <a:avLst/>
+          </a:prstGeom>
+          <a:solidFill>
+            <a:schemeClr val="accent1"/>
+          </a:solidFill>
+          <a:ln>
+            <a:noFill/>
+          </a:ln>
+        </p:spPr>
+        <p:txBody>
+          <a:bodyPr anchorCtr="0" anchor="ctr" bIns="91425" lIns="91425" rIns="91425" tIns="91425">
+            <a:noAutofit/>
+          </a:bodyPr>
+          <a:lstStyle/>
+          <a:p>
+            <a:pPr lvl="0" rtl="0" algn="ctr">
+              <a:spcBef>
+                <a:spcPts val="0"/>
+              </a:spcBef>
+              <a:buNone/>
+            </a:pPr>
+            <a:r>
+              <a:rPr lang="en">
+                <a:solidFill>
+                  <a:schemeClr val="lt1"/>
+                </a:solidFill>
+              </a:rPr>
+              <a:t>JSSE</a:t>
+            </a:r>
+          </a:p>
+        </p:txBody>
+      </p:sp>
+      <p:cxnSp>
+        <p:nvCxnSpPr>
+          <p:cNvPr id="147" name="Shape 147"/>
+          <p:cNvCxnSpPr>
+            <a:stCxn id="146" idx="0"/>
+            <a:endCxn id="143" idx="2"/>
+          </p:cNvCxnSpPr>
+          <p:nvPr/>
+        </p:nvCxnSpPr>
+        <p:spPr>
+          <a:xfrm rot="10800000">
+            <a:off x="5890062" y="3154250"/>
+            <a:ext cx="0" cy="724500"/>
+          </a:xfrm>
+          <a:prstGeom prst="straightConnector1">
+            <a:avLst/>
+          </a:prstGeom>
+          <a:noFill/>
+          <a:ln cap="flat" cmpd="sng" w="9525">
+            <a:solidFill>
+              <a:schemeClr val="dk2"/>
+            </a:solidFill>
+            <a:prstDash val="solid"/>
+            <a:round/>
+            <a:headEnd len="lg" w="lg" type="none"/>
+            <a:tailEnd len="lg" w="lg" type="triangle"/>
+          </a:ln>
+        </p:spPr>
+      </p:cxnSp>
+      <p:cxnSp>
+        <p:nvCxnSpPr>
+          <p:cNvPr id="148" name="Shape 148"/>
+          <p:cNvCxnSpPr>
+            <a:stCxn id="146" idx="0"/>
+            <a:endCxn id="144" idx="2"/>
+          </p:cNvCxnSpPr>
+          <p:nvPr/>
+        </p:nvCxnSpPr>
+        <p:spPr>
+          <a:xfrm rot="10800000">
+            <a:off x="3275862" y="3154250"/>
+            <a:ext cx="2614200" cy="724500"/>
+          </a:xfrm>
+          <a:prstGeom prst="straightConnector1">
+            <a:avLst/>
+          </a:prstGeom>
+          <a:noFill/>
+          <a:ln cap="flat" cmpd="sng" w="9525">
+            <a:solidFill>
+              <a:schemeClr val="dk2"/>
+            </a:solidFill>
+            <a:prstDash val="solid"/>
+            <a:round/>
+            <a:headEnd len="lg" w="lg" type="none"/>
+            <a:tailEnd len="lg" w="lg" type="triangle"/>
+          </a:ln>
+        </p:spPr>
+      </p:cxnSp>
+      <p:cxnSp>
+        <p:nvCxnSpPr>
+          <p:cNvPr id="149" name="Shape 149"/>
+          <p:cNvCxnSpPr>
+            <a:stCxn id="145" idx="0"/>
+            <a:endCxn id="144" idx="2"/>
+          </p:cNvCxnSpPr>
+          <p:nvPr/>
+        </p:nvCxnSpPr>
+        <p:spPr>
+          <a:xfrm rot="10800000">
+            <a:off x="3275837" y="3154250"/>
+            <a:ext cx="0" cy="724500"/>
+          </a:xfrm>
+          <a:prstGeom prst="straightConnector1">
+            <a:avLst/>
+          </a:prstGeom>
+          <a:noFill/>
+          <a:ln cap="flat" cmpd="sng" w="9525">
+            <a:solidFill>
+              <a:schemeClr val="dk2"/>
+            </a:solidFill>
+            <a:prstDash val="solid"/>
+            <a:round/>
+            <a:headEnd len="lg" w="lg" type="none"/>
+            <a:tailEnd len="lg" w="lg" type="triangle"/>
+          </a:ln>
+        </p:spPr>
+      </p:cxnSp>
+      <p:cxnSp>
+        <p:nvCxnSpPr>
+          <p:cNvPr id="150" name="Shape 150"/>
+          <p:cNvCxnSpPr>
+            <a:stCxn id="145" idx="0"/>
+            <a:endCxn id="143" idx="2"/>
+          </p:cNvCxnSpPr>
+          <p:nvPr/>
+        </p:nvCxnSpPr>
+        <p:spPr>
+          <a:xfrm flipH="1" rot="10800000">
+            <a:off x="3275837" y="3154250"/>
+            <a:ext cx="2614200" cy="724500"/>
+          </a:xfrm>
+          <a:prstGeom prst="straightConnector1">
+            <a:avLst/>
+          </a:prstGeom>
+          <a:noFill/>
+          <a:ln cap="flat" cmpd="sng" w="28575">
+            <a:solidFill>
+              <a:schemeClr val="accent6"/>
+            </a:solidFill>
+            <a:prstDash val="solid"/>
+            <a:round/>
+            <a:headEnd len="lg" w="lg" type="none"/>
+            <a:tailEnd len="lg" w="lg" type="triangle"/>
+          </a:ln>
+        </p:spPr>
+      </p:cxnSp>
     </p:spTree>
   </p:cSld>
   <p:clrMapOvr>
@@ -6325,7 +6996,7 @@
   <p:cSld>
     <p:spTree>
       <p:nvGrpSpPr>
-        <p:cNvPr id="138" name="Shape 138"/>
+        <p:cNvPr id="154" name="Shape 154"/>
         <p:cNvGrpSpPr/>
         <p:nvPr/>
       </p:nvGrpSpPr>
@@ -6339,7 +7010,7 @@
       </p:grpSpPr>
       <p:sp>
         <p:nvSpPr>
-          <p:cNvPr id="139" name="Shape 139"/>
+          <p:cNvPr id="155" name="Shape 155"/>
           <p:cNvSpPr txBox="1"/>
           <p:nvPr>
             <p:ph type="title"/>
@@ -6368,14 +7039,14 @@
             </a:pPr>
             <a:r>
               <a:rPr lang="en"/>
-              <a:t>Conclusion</a:t>
-            </a:r>
-          </a:p>
-        </p:txBody>
-      </p:sp>
-      <p:sp>
-        <p:nvSpPr>
-          <p:cNvPr id="140" name="Shape 140"/>
+              <a:t>Tentative Schedule</a:t>
+            </a:r>
+          </a:p>
+        </p:txBody>
+      </p:sp>
+      <p:sp>
+        <p:nvSpPr>
+          <p:cNvPr id="156" name="Shape 156"/>
           <p:cNvSpPr txBox="1"/>
           <p:nvPr>
             <p:ph idx="1" type="body"/>
@@ -6396,37 +7067,104 @@
           </a:bodyPr>
           <a:lstStyle/>
           <a:p>
-            <a:pPr lvl="0" rtl="0">
-              <a:spcBef>
-                <a:spcPts val="0"/>
-              </a:spcBef>
-              <a:buNone/>
+            <a:pPr indent="-228600" lvl="0" marL="457200" rtl="0">
+              <a:spcBef>
+                <a:spcPts val="0"/>
+              </a:spcBef>
             </a:pPr>
             <a:r>
               <a:rPr lang="en"/>
-              <a:t>The main challenges of this project will be :</a:t>
-            </a:r>
-          </a:p>
-          <a:p>
-            <a:pPr indent="-228600" lvl="0" marL="914400" rtl="0">
+              <a:t>Study the source code (</a:t>
+            </a:r>
+            <a:r>
+              <a:rPr b="1" lang="en"/>
+              <a:t>~26.03)</a:t>
+            </a:r>
+          </a:p>
+          <a:p>
+            <a:pPr indent="-228600" lvl="0" marL="457200" rtl="0">
               <a:spcBef>
                 <a:spcPts val="0"/>
               </a:spcBef>
             </a:pPr>
             <a:r>
               <a:rPr lang="en"/>
-              <a:t>Understand the different projects and how they work together </a:t>
-            </a:r>
-          </a:p>
-          <a:p>
-            <a:pPr indent="-228600" lvl="0" marL="914400" rtl="0">
+              <a:t>Remove unneeded code from Tomcat Native (</a:t>
+            </a:r>
+            <a:r>
+              <a:rPr b="1" lang="en"/>
+              <a:t>~10.04)</a:t>
+            </a:r>
+          </a:p>
+          <a:p>
+            <a:pPr indent="-228600" lvl="0" marL="457200" rtl="0">
               <a:spcBef>
                 <a:spcPts val="0"/>
               </a:spcBef>
             </a:pPr>
             <a:r>
               <a:rPr lang="en"/>
-              <a:t>Adapt Tomcat Native and Undertow to work with OpenSSL</a:t>
+              <a:t>Modify Tomcat Native (</a:t>
+            </a:r>
+            <a:r>
+              <a:rPr b="1" lang="en"/>
+              <a:t>~08.05</a:t>
+            </a:r>
+            <a:r>
+              <a:rPr lang="en"/>
+              <a:t>)</a:t>
+            </a:r>
+          </a:p>
+          <a:p>
+            <a:pPr indent="-228600" lvl="1" marL="914400" rtl="0">
+              <a:spcBef>
+                <a:spcPts val="0"/>
+              </a:spcBef>
+            </a:pPr>
+            <a:r>
+              <a:rPr lang="en"/>
+              <a:t>Make it compatible with Undertow </a:t>
+            </a:r>
+          </a:p>
+          <a:p>
+            <a:pPr indent="-228600" lvl="1" marL="914400" rtl="0">
+              <a:spcBef>
+                <a:spcPts val="0"/>
+              </a:spcBef>
+            </a:pPr>
+            <a:r>
+              <a:rPr lang="en"/>
+              <a:t>Keep compatibility with Tomcat </a:t>
+            </a:r>
+          </a:p>
+          <a:p>
+            <a:pPr indent="-228600" lvl="0" marL="457200" rtl="0">
+              <a:spcBef>
+                <a:spcPts val="0"/>
+              </a:spcBef>
+            </a:pPr>
+            <a:r>
+              <a:rPr lang="en"/>
+              <a:t>Run Benchmarks in Red Hat to test performance (Possibly done by Red Hat) (</a:t>
+            </a:r>
+            <a:r>
+              <a:rPr b="1" lang="en"/>
+              <a:t>~15.05)</a:t>
+            </a:r>
+          </a:p>
+          <a:p>
+            <a:pPr indent="-228600" lvl="0" marL="457200" rtl="0">
+              <a:spcBef>
+                <a:spcPts val="0"/>
+              </a:spcBef>
+            </a:pPr>
+            <a:r>
+              <a:rPr lang="en"/>
+              <a:t>Implement JNI calls to make more OpenSSL features available in Tomcat Native (</a:t>
+            </a:r>
+            <a:r>
+              <a:rPr b="1" lang="en"/>
+              <a:t>~29.05)</a:t>
             </a:r>
           </a:p>
         </p:txBody>
@@ -6447,7 +7185,7 @@
   <p:cSld>
     <p:spTree>
       <p:nvGrpSpPr>
-        <p:cNvPr id="144" name="Shape 144"/>
+        <p:cNvPr id="160" name="Shape 160"/>
         <p:cNvGrpSpPr/>
         <p:nvPr/>
       </p:nvGrpSpPr>
@@ -6461,7 +7199,7 @@
       </p:grpSpPr>
       <p:sp>
         <p:nvSpPr>
-          <p:cNvPr id="145" name="Shape 145"/>
+          <p:cNvPr id="161" name="Shape 161"/>
           <p:cNvSpPr txBox="1"/>
           <p:nvPr>
             <p:ph type="title"/>
@@ -6482,6 +7220,328 @@
           </a:bodyPr>
           <a:lstStyle/>
           <a:p>
+            <a:pPr lvl="0" rtl="0">
+              <a:spcBef>
+                <a:spcPts val="0"/>
+              </a:spcBef>
+              <a:buNone/>
+            </a:pPr>
+            <a:r>
+              <a:rPr lang="en"/>
+              <a:t>Motivations (1)</a:t>
+            </a:r>
+          </a:p>
+        </p:txBody>
+      </p:sp>
+      <p:sp>
+        <p:nvSpPr>
+          <p:cNvPr id="162" name="Shape 162"/>
+          <p:cNvSpPr txBox="1"/>
+          <p:nvPr>
+            <p:ph idx="1" type="body"/>
+          </p:nvPr>
+        </p:nvSpPr>
+        <p:spPr>
+          <a:xfrm>
+            <a:off x="471900" y="1919075"/>
+            <a:ext cx="8222100" cy="2710200"/>
+          </a:xfrm>
+          <a:prstGeom prst="rect">
+            <a:avLst/>
+          </a:prstGeom>
+        </p:spPr>
+        <p:txBody>
+          <a:bodyPr anchorCtr="0" anchor="t" bIns="91425" lIns="91425" rIns="91425" tIns="91425">
+            <a:noAutofit/>
+          </a:bodyPr>
+          <a:lstStyle/>
+          <a:p>
+            <a:pPr indent="-228600" lvl="0" marL="457200" rtl="0">
+              <a:spcBef>
+                <a:spcPts val="0"/>
+              </a:spcBef>
+            </a:pPr>
+            <a:r>
+              <a:rPr lang="en"/>
+              <a:t>Tomcat Native has JNI interfaces for most of the APR APIs</a:t>
+            </a:r>
+          </a:p>
+          <a:p>
+            <a:pPr indent="-228600" lvl="1" marL="914400" rtl="0">
+              <a:spcBef>
+                <a:spcPts val="0"/>
+              </a:spcBef>
+            </a:pPr>
+            <a:r>
+              <a:rPr lang="en"/>
+              <a:t>We only want a subset that focuses on OpenSSL</a:t>
+            </a:r>
+          </a:p>
+          <a:p>
+            <a:pPr indent="-228600" lvl="0" marL="457200" rtl="0">
+              <a:spcBef>
+                <a:spcPts val="0"/>
+              </a:spcBef>
+            </a:pPr>
+            <a:r>
+              <a:rPr lang="en"/>
+              <a:t>Undertow is using JSSE which performs poorly</a:t>
+            </a:r>
+          </a:p>
+          <a:p>
+            <a:pPr indent="-228600" lvl="0" marL="457200" rtl="0">
+              <a:spcBef>
+                <a:spcPts val="0"/>
+              </a:spcBef>
+            </a:pPr>
+            <a:r>
+              <a:rPr lang="en"/>
+              <a:t>OpenSSL is efficient, active and cross-platform</a:t>
+            </a:r>
+          </a:p>
+          <a:p>
+            <a:pPr indent="-228600" lvl="0" marL="457200" rtl="0">
+              <a:spcBef>
+                <a:spcPts val="0"/>
+              </a:spcBef>
+            </a:pPr>
+            <a:r>
+              <a:rPr lang="en"/>
+              <a:t>Ability to use Tomcat with OpenSSL without loading APR</a:t>
+            </a:r>
+          </a:p>
+          <a:p>
+            <a:pPr lvl="0" rtl="0">
+              <a:spcBef>
+                <a:spcPts val="0"/>
+              </a:spcBef>
+              <a:buNone/>
+            </a:pPr>
+            <a:r>
+              <a:rPr lang="en"/>
+              <a:t>Using Undertow directly with OpenSSL should perform better and be easier to maintain</a:t>
+            </a:r>
+          </a:p>
+          <a:p>
+            <a:pPr lvl="0" rtl="0">
+              <a:spcBef>
+                <a:spcPts val="0"/>
+              </a:spcBef>
+              <a:buNone/>
+            </a:pPr>
+            <a:r>
+              <a:t/>
+            </a:r>
+            <a:endParaRPr/>
+          </a:p>
+        </p:txBody>
+      </p:sp>
+    </p:spTree>
+  </p:cSld>
+  <p:clrMapOvr>
+    <a:masterClrMapping/>
+  </p:clrMapOvr>
+  <p:transition spd="slow">
+    <p:cut/>
+  </p:transition>
+</p:sld>
+</file>
+
+<file path=ppt/slides/slide14.xml><?xml version="1.0" encoding="utf-8"?>
+<p:sld xmlns:a="http://schemas.openxmlformats.org/drawingml/2006/main" xmlns:r="http://schemas.openxmlformats.org/officeDocument/2006/relationships" xmlns:mc="http://schemas.openxmlformats.org/markup-compatibility/2006" xmlns:mv="urn:schemas-microsoft-com:mac:vml" xmlns:p="http://schemas.openxmlformats.org/presentationml/2006/main" xmlns:c="http://schemas.openxmlformats.org/drawingml/2006/chart" xmlns:dgm="http://schemas.openxmlformats.org/drawingml/2006/diagram" xmlns:o="urn:schemas-microsoft-com:office:office" xmlns:v="urn:schemas-microsoft-com:vml" xmlns:pvml="urn:schemas-microsoft-com:office:powerpoint" xmlns:com="http://schemas.openxmlformats.org/drawingml/2006/compatibility" xmlns:p14="http://schemas.microsoft.com/office/powerpoint/2010/main">
+  <p:cSld>
+    <p:spTree>
+      <p:nvGrpSpPr>
+        <p:cNvPr id="166" name="Shape 166"/>
+        <p:cNvGrpSpPr/>
+        <p:nvPr/>
+      </p:nvGrpSpPr>
+      <p:grpSpPr>
+        <a:xfrm>
+          <a:off x="0" y="0"/>
+          <a:ext cx="0" cy="0"/>
+          <a:chOff x="0" y="0"/>
+          <a:chExt cx="0" cy="0"/>
+        </a:xfrm>
+      </p:grpSpPr>
+      <p:sp>
+        <p:nvSpPr>
+          <p:cNvPr id="167" name="Shape 167"/>
+          <p:cNvSpPr txBox="1"/>
+          <p:nvPr>
+            <p:ph type="title"/>
+          </p:nvPr>
+        </p:nvSpPr>
+        <p:spPr>
+          <a:xfrm>
+            <a:off x="471900" y="738725"/>
+            <a:ext cx="8222100" cy="767700"/>
+          </a:xfrm>
+          <a:prstGeom prst="rect">
+            <a:avLst/>
+          </a:prstGeom>
+        </p:spPr>
+        <p:txBody>
+          <a:bodyPr anchorCtr="0" anchor="b" bIns="91425" lIns="91425" rIns="91425" tIns="91425">
+            <a:noAutofit/>
+          </a:bodyPr>
+          <a:lstStyle/>
+          <a:p>
+            <a:pPr lvl="0" rtl="0">
+              <a:spcBef>
+                <a:spcPts val="0"/>
+              </a:spcBef>
+              <a:buNone/>
+            </a:pPr>
+            <a:r>
+              <a:rPr lang="en"/>
+              <a:t>Challenges</a:t>
+            </a:r>
+          </a:p>
+        </p:txBody>
+      </p:sp>
+      <p:sp>
+        <p:nvSpPr>
+          <p:cNvPr id="168" name="Shape 168"/>
+          <p:cNvSpPr txBox="1"/>
+          <p:nvPr>
+            <p:ph idx="1" type="body"/>
+          </p:nvPr>
+        </p:nvSpPr>
+        <p:spPr>
+          <a:xfrm>
+            <a:off x="471900" y="1919075"/>
+            <a:ext cx="8222100" cy="2710200"/>
+          </a:xfrm>
+          <a:prstGeom prst="rect">
+            <a:avLst/>
+          </a:prstGeom>
+        </p:spPr>
+        <p:txBody>
+          <a:bodyPr anchorCtr="0" anchor="t" bIns="91425" lIns="91425" rIns="91425" tIns="91425">
+            <a:noAutofit/>
+          </a:bodyPr>
+          <a:lstStyle/>
+          <a:p>
+            <a:pPr lvl="0" rtl="0">
+              <a:spcBef>
+                <a:spcPts val="0"/>
+              </a:spcBef>
+              <a:buNone/>
+            </a:pPr>
+            <a:r>
+              <a:rPr lang="en"/>
+              <a:t>The main challenges of this project will be :</a:t>
+            </a:r>
+          </a:p>
+          <a:p>
+            <a:pPr indent="-228600" lvl="0" marL="914400" rtl="0">
+              <a:spcBef>
+                <a:spcPts val="0"/>
+              </a:spcBef>
+            </a:pPr>
+            <a:r>
+              <a:rPr lang="en"/>
+              <a:t>Understand the different projects and how they work together </a:t>
+            </a:r>
+          </a:p>
+          <a:p>
+            <a:pPr indent="-228600" lvl="1" marL="1371600" rtl="0">
+              <a:spcBef>
+                <a:spcPts val="0"/>
+              </a:spcBef>
+            </a:pPr>
+            <a:r>
+              <a:rPr lang="en"/>
+              <a:t>Red Hat can help</a:t>
+            </a:r>
+          </a:p>
+          <a:p>
+            <a:pPr indent="-228600" lvl="0" marL="914400" rtl="0">
+              <a:spcBef>
+                <a:spcPts val="0"/>
+              </a:spcBef>
+            </a:pPr>
+            <a:r>
+              <a:rPr lang="en"/>
+              <a:t>Adapt Tomcat Native and Undertow to work with OpenSSL natively</a:t>
+            </a:r>
+          </a:p>
+          <a:p>
+            <a:pPr indent="-228600" lvl="1" marL="1371600" rtl="0">
+              <a:spcBef>
+                <a:spcPts val="0"/>
+              </a:spcBef>
+            </a:pPr>
+            <a:r>
+              <a:rPr lang="en"/>
+              <a:t>Numa’s code as well as Stuart’s code can help</a:t>
+            </a:r>
+          </a:p>
+          <a:p>
+            <a:pPr indent="-228600" lvl="0" marL="914400" rtl="0">
+              <a:spcBef>
+                <a:spcPts val="0"/>
+              </a:spcBef>
+            </a:pPr>
+            <a:r>
+              <a:rPr lang="en"/>
+              <a:t>Adapting Tomcat Native to Undertow might not be the best solution</a:t>
+            </a:r>
+          </a:p>
+        </p:txBody>
+      </p:sp>
+    </p:spTree>
+  </p:cSld>
+  <p:clrMapOvr>
+    <a:masterClrMapping/>
+  </p:clrMapOvr>
+  <p:transition spd="slow">
+    <p:cut/>
+  </p:transition>
+</p:sld>
+</file>
+
+<file path=ppt/slides/slide15.xml><?xml version="1.0" encoding="utf-8"?>
+<p:sld xmlns:a="http://schemas.openxmlformats.org/drawingml/2006/main" xmlns:r="http://schemas.openxmlformats.org/officeDocument/2006/relationships" xmlns:mc="http://schemas.openxmlformats.org/markup-compatibility/2006" xmlns:mv="urn:schemas-microsoft-com:mac:vml" xmlns:p="http://schemas.openxmlformats.org/presentationml/2006/main" xmlns:c="http://schemas.openxmlformats.org/drawingml/2006/chart" xmlns:dgm="http://schemas.openxmlformats.org/drawingml/2006/diagram" xmlns:o="urn:schemas-microsoft-com:office:office" xmlns:v="urn:schemas-microsoft-com:vml" xmlns:pvml="urn:schemas-microsoft-com:office:powerpoint" xmlns:com="http://schemas.openxmlformats.org/drawingml/2006/compatibility" xmlns:p14="http://schemas.microsoft.com/office/powerpoint/2010/main">
+  <p:cSld>
+    <p:spTree>
+      <p:nvGrpSpPr>
+        <p:cNvPr id="172" name="Shape 172"/>
+        <p:cNvGrpSpPr/>
+        <p:nvPr/>
+      </p:nvGrpSpPr>
+      <p:grpSpPr>
+        <a:xfrm>
+          <a:off x="0" y="0"/>
+          <a:ext cx="0" cy="0"/>
+          <a:chOff x="0" y="0"/>
+          <a:chExt cx="0" cy="0"/>
+        </a:xfrm>
+      </p:grpSpPr>
+      <p:sp>
+        <p:nvSpPr>
+          <p:cNvPr id="173" name="Shape 173"/>
+          <p:cNvSpPr txBox="1"/>
+          <p:nvPr>
+            <p:ph type="title"/>
+          </p:nvPr>
+        </p:nvSpPr>
+        <p:spPr>
+          <a:xfrm>
+            <a:off x="471900" y="738725"/>
+            <a:ext cx="8222100" cy="767700"/>
+          </a:xfrm>
+          <a:prstGeom prst="rect">
+            <a:avLst/>
+          </a:prstGeom>
+        </p:spPr>
+        <p:txBody>
+          <a:bodyPr anchorCtr="0" anchor="b" bIns="91425" lIns="91425" rIns="91425" tIns="91425">
+            <a:noAutofit/>
+          </a:bodyPr>
+          <a:lstStyle/>
+          <a:p>
             <a:pPr lvl="0">
               <a:spcBef>
                 <a:spcPts val="0"/>
@@ -6497,7 +7557,7 @@
       </p:sp>
       <p:pic>
         <p:nvPicPr>
-          <p:cNvPr id="146" name="Shape 146"/>
+          <p:cNvPr id="174" name="Shape 174"/>
           <p:cNvPicPr preferRelativeResize="0"/>
           <p:nvPr/>
         </p:nvPicPr>
@@ -6758,7 +7818,7 @@
             </a:pPr>
             <a:r>
               <a:rPr lang="en"/>
-              <a:t>Undertow</a:t>
+              <a:t>Undertow &amp; Tomcat</a:t>
             </a:r>
           </a:p>
         </p:txBody>
@@ -6794,11 +7854,52 @@
             </a:pPr>
             <a:r>
               <a:rPr lang="en"/>
-              <a:t>Undertow is a flexible performant web server integrated into </a:t>
+              <a:t>Undertow and Tomcat are very similar, they:</a:t>
+            </a:r>
+          </a:p>
+          <a:p>
+            <a:pPr indent="-228600" lvl="0" marL="914400" rtl="0">
+              <a:spcBef>
+                <a:spcPts val="0"/>
+              </a:spcBef>
+            </a:pPr>
+            <a:r>
+              <a:rPr lang="en"/>
+              <a:t>Are Web servers</a:t>
+            </a:r>
+          </a:p>
+          <a:p>
+            <a:pPr indent="-228600" lvl="0" marL="914400" rtl="0">
+              <a:spcBef>
+                <a:spcPts val="0"/>
+              </a:spcBef>
+            </a:pPr>
+            <a:r>
+              <a:rPr lang="en"/>
+              <a:t>Are Servlet containers using </a:t>
             </a:r>
             <a:r>
               <a:rPr b="1" lang="en"/>
-              <a:t>Wildfly Application Server </a:t>
+              <a:t>JSSE</a:t>
+            </a:r>
+          </a:p>
+          <a:p>
+            <a:pPr indent="-228600" lvl="0" marL="914400" rtl="0">
+              <a:spcBef>
+                <a:spcPts val="0"/>
+              </a:spcBef>
+            </a:pPr>
+            <a:r>
+              <a:rPr lang="en"/>
+              <a:t>Use SSL </a:t>
+            </a:r>
+            <a:r>
+              <a:rPr b="1" lang="en"/>
+              <a:t>JSSE</a:t>
+            </a:r>
+            <a:r>
+              <a:rPr lang="en"/>
+              <a:t> Engine</a:t>
             </a:r>
           </a:p>
           <a:p>
@@ -6810,29 +7911,11 @@
             </a:pPr>
             <a:r>
               <a:rPr lang="en"/>
-              <a:t>It supports :</a:t>
-            </a:r>
-          </a:p>
-          <a:p>
-            <a:pPr indent="-228600" lvl="0" marL="914400" rtl="0">
-              <a:spcBef>
-                <a:spcPts val="0"/>
-              </a:spcBef>
-            </a:pPr>
-            <a:r>
-              <a:rPr lang="en"/>
-              <a:t>Websockets</a:t>
-            </a:r>
-          </a:p>
-          <a:p>
-            <a:pPr indent="-228600" lvl="0" marL="914400" rtl="0">
-              <a:spcBef>
-                <a:spcPts val="0"/>
-              </a:spcBef>
-            </a:pPr>
-            <a:r>
-              <a:rPr lang="en"/>
-              <a:t>Servlet 3.1</a:t>
+              <a:t>Undertow is used specifically as the Web Server component in </a:t>
+            </a:r>
+            <a:r>
+              <a:rPr b="1" lang="en"/>
+              <a:t>Wildfly</a:t>
             </a:r>
           </a:p>
           <a:p>
@@ -6843,12 +7926,8 @@
               <a:buNone/>
             </a:pPr>
             <a:r>
-              <a:rPr lang="en"/>
-              <a:t>In 2014, it replaced JBoss Web Server as the Web Server for </a:t>
-            </a:r>
-            <a:r>
               <a:rPr b="1" lang="en"/>
-              <a:t>Wildfly Application Server</a:t>
+              <a:t>=&gt; We can use Tomcat Native in Undertow with some modifications</a:t>
             </a:r>
           </a:p>
         </p:txBody>
@@ -7048,7 +8127,7 @@
           </a:bodyPr>
           <a:lstStyle/>
           <a:p>
-            <a:pPr lvl="0">
+            <a:pPr lvl="0" rtl="0">
               <a:spcBef>
                 <a:spcPts val="0"/>
               </a:spcBef>
@@ -7056,7 +8135,7 @@
             </a:pPr>
             <a:r>
               <a:rPr lang="en"/>
-              <a:t>SSL/TLS Protocol</a:t>
+              <a:t>Tomcat Native</a:t>
             </a:r>
           </a:p>
         </p:txBody>
@@ -7064,19 +8143,284 @@
       <p:sp>
         <p:nvSpPr>
           <p:cNvPr id="93" name="Shape 93"/>
+          <p:cNvSpPr/>
+          <p:nvPr/>
+        </p:nvSpPr>
+        <p:spPr>
+          <a:xfrm>
+            <a:off x="5021862" y="2505825"/>
+            <a:ext cx="1736400" cy="648300"/>
+          </a:xfrm>
+          <a:prstGeom prst="rect">
+            <a:avLst/>
+          </a:prstGeom>
+          <a:solidFill>
+            <a:schemeClr val="accent5"/>
+          </a:solidFill>
+          <a:ln>
+            <a:noFill/>
+          </a:ln>
+        </p:spPr>
+        <p:txBody>
+          <a:bodyPr anchorCtr="0" anchor="ctr" bIns="91425" lIns="91425" rIns="91425" tIns="91425">
+            <a:noAutofit/>
+          </a:bodyPr>
+          <a:lstStyle/>
+          <a:p>
+            <a:pPr lvl="0" algn="ctr">
+              <a:spcBef>
+                <a:spcPts val="0"/>
+              </a:spcBef>
+              <a:buNone/>
+            </a:pPr>
+            <a:r>
+              <a:rPr lang="en">
+                <a:solidFill>
+                  <a:schemeClr val="lt1"/>
+                </a:solidFill>
+              </a:rPr>
+              <a:t>Undertow</a:t>
+            </a:r>
+          </a:p>
+        </p:txBody>
+      </p:sp>
+      <p:sp>
+        <p:nvSpPr>
+          <p:cNvPr id="94" name="Shape 94"/>
+          <p:cNvSpPr/>
+          <p:nvPr/>
+        </p:nvSpPr>
+        <p:spPr>
+          <a:xfrm>
+            <a:off x="2407637" y="2505825"/>
+            <a:ext cx="1736400" cy="648300"/>
+          </a:xfrm>
+          <a:prstGeom prst="rect">
+            <a:avLst/>
+          </a:prstGeom>
+          <a:solidFill>
+            <a:schemeClr val="accent5"/>
+          </a:solidFill>
+          <a:ln>
+            <a:noFill/>
+          </a:ln>
+        </p:spPr>
+        <p:txBody>
+          <a:bodyPr anchorCtr="0" anchor="ctr" bIns="91425" lIns="91425" rIns="91425" tIns="91425">
+            <a:noAutofit/>
+          </a:bodyPr>
+          <a:lstStyle/>
+          <a:p>
+            <a:pPr lvl="0" rtl="0" algn="ctr">
+              <a:spcBef>
+                <a:spcPts val="0"/>
+              </a:spcBef>
+              <a:buNone/>
+            </a:pPr>
+            <a:r>
+              <a:rPr lang="en">
+                <a:solidFill>
+                  <a:schemeClr val="lt1"/>
+                </a:solidFill>
+              </a:rPr>
+              <a:t>Tomcat</a:t>
+            </a:r>
+          </a:p>
+        </p:txBody>
+      </p:sp>
+      <p:sp>
+        <p:nvSpPr>
+          <p:cNvPr id="95" name="Shape 95"/>
+          <p:cNvSpPr/>
+          <p:nvPr/>
+        </p:nvSpPr>
+        <p:spPr>
+          <a:xfrm>
+            <a:off x="2407637" y="3878750"/>
+            <a:ext cx="1736400" cy="648300"/>
+          </a:xfrm>
+          <a:prstGeom prst="rect">
+            <a:avLst/>
+          </a:prstGeom>
+          <a:solidFill>
+            <a:schemeClr val="accent1"/>
+          </a:solidFill>
+          <a:ln>
+            <a:noFill/>
+          </a:ln>
+        </p:spPr>
+        <p:txBody>
+          <a:bodyPr anchorCtr="0" anchor="ctr" bIns="91425" lIns="91425" rIns="91425" tIns="91425">
+            <a:noAutofit/>
+          </a:bodyPr>
+          <a:lstStyle/>
+          <a:p>
+            <a:pPr lvl="0" rtl="0" algn="ctr">
+              <a:spcBef>
+                <a:spcPts val="0"/>
+              </a:spcBef>
+              <a:buNone/>
+            </a:pPr>
+            <a:r>
+              <a:rPr lang="en">
+                <a:solidFill>
+                  <a:schemeClr val="lt1"/>
+                </a:solidFill>
+              </a:rPr>
+              <a:t>tc-native</a:t>
+            </a:r>
+          </a:p>
+        </p:txBody>
+      </p:sp>
+      <p:sp>
+        <p:nvSpPr>
+          <p:cNvPr id="96" name="Shape 96"/>
+          <p:cNvSpPr/>
+          <p:nvPr/>
+        </p:nvSpPr>
+        <p:spPr>
+          <a:xfrm>
+            <a:off x="5021862" y="3878750"/>
+            <a:ext cx="1736400" cy="648300"/>
+          </a:xfrm>
+          <a:prstGeom prst="rect">
+            <a:avLst/>
+          </a:prstGeom>
+          <a:solidFill>
+            <a:schemeClr val="accent1"/>
+          </a:solidFill>
+          <a:ln>
+            <a:noFill/>
+          </a:ln>
+        </p:spPr>
+        <p:txBody>
+          <a:bodyPr anchorCtr="0" anchor="ctr" bIns="91425" lIns="91425" rIns="91425" tIns="91425">
+            <a:noAutofit/>
+          </a:bodyPr>
+          <a:lstStyle/>
+          <a:p>
+            <a:pPr lvl="0" rtl="0" algn="ctr">
+              <a:spcBef>
+                <a:spcPts val="0"/>
+              </a:spcBef>
+              <a:buNone/>
+            </a:pPr>
+            <a:r>
+              <a:rPr lang="en">
+                <a:solidFill>
+                  <a:schemeClr val="lt1"/>
+                </a:solidFill>
+              </a:rPr>
+              <a:t>JSSE</a:t>
+            </a:r>
+          </a:p>
+        </p:txBody>
+      </p:sp>
+      <p:cxnSp>
+        <p:nvCxnSpPr>
+          <p:cNvPr id="97" name="Shape 97"/>
+          <p:cNvCxnSpPr>
+            <a:stCxn id="96" idx="0"/>
+            <a:endCxn id="93" idx="2"/>
+          </p:cNvCxnSpPr>
+          <p:nvPr/>
+        </p:nvCxnSpPr>
+        <p:spPr>
+          <a:xfrm rot="10800000">
+            <a:off x="5890062" y="3154250"/>
+            <a:ext cx="0" cy="724500"/>
+          </a:xfrm>
+          <a:prstGeom prst="straightConnector1">
+            <a:avLst/>
+          </a:prstGeom>
+          <a:noFill/>
+          <a:ln cap="flat" cmpd="sng" w="9525">
+            <a:solidFill>
+              <a:schemeClr val="dk2"/>
+            </a:solidFill>
+            <a:prstDash val="solid"/>
+            <a:round/>
+            <a:headEnd len="lg" w="lg" type="none"/>
+            <a:tailEnd len="lg" w="lg" type="triangle"/>
+          </a:ln>
+        </p:spPr>
+      </p:cxnSp>
+      <p:cxnSp>
+        <p:nvCxnSpPr>
+          <p:cNvPr id="98" name="Shape 98"/>
+          <p:cNvCxnSpPr>
+            <a:stCxn id="96" idx="0"/>
+            <a:endCxn id="94" idx="2"/>
+          </p:cNvCxnSpPr>
+          <p:nvPr/>
+        </p:nvCxnSpPr>
+        <p:spPr>
+          <a:xfrm rot="10800000">
+            <a:off x="3275862" y="3154250"/>
+            <a:ext cx="2614200" cy="724500"/>
+          </a:xfrm>
+          <a:prstGeom prst="straightConnector1">
+            <a:avLst/>
+          </a:prstGeom>
+          <a:noFill/>
+          <a:ln cap="flat" cmpd="sng" w="9525">
+            <a:solidFill>
+              <a:schemeClr val="dk2"/>
+            </a:solidFill>
+            <a:prstDash val="solid"/>
+            <a:round/>
+            <a:headEnd len="lg" w="lg" type="none"/>
+            <a:tailEnd len="lg" w="lg" type="triangle"/>
+          </a:ln>
+        </p:spPr>
+      </p:cxnSp>
+      <p:cxnSp>
+        <p:nvCxnSpPr>
+          <p:cNvPr id="99" name="Shape 99"/>
+          <p:cNvCxnSpPr>
+            <a:stCxn id="95" idx="0"/>
+            <a:endCxn id="94" idx="2"/>
+          </p:cNvCxnSpPr>
+          <p:nvPr/>
+        </p:nvCxnSpPr>
+        <p:spPr>
+          <a:xfrm rot="10800000">
+            <a:off x="3275837" y="3154250"/>
+            <a:ext cx="0" cy="724500"/>
+          </a:xfrm>
+          <a:prstGeom prst="straightConnector1">
+            <a:avLst/>
+          </a:prstGeom>
+          <a:noFill/>
+          <a:ln cap="flat" cmpd="sng" w="9525">
+            <a:solidFill>
+              <a:schemeClr val="dk2"/>
+            </a:solidFill>
+            <a:prstDash val="solid"/>
+            <a:round/>
+            <a:headEnd len="lg" w="lg" type="none"/>
+            <a:tailEnd len="lg" w="lg" type="triangle"/>
+          </a:ln>
+        </p:spPr>
+      </p:cxnSp>
+      <p:sp>
+        <p:nvSpPr>
+          <p:cNvPr id="100" name="Shape 100"/>
           <p:cNvSpPr txBox="1"/>
-          <p:nvPr>
-            <p:ph idx="1" type="body"/>
-          </p:nvPr>
-        </p:nvSpPr>
-        <p:spPr>
-          <a:xfrm>
-            <a:off x="471900" y="1919075"/>
-            <a:ext cx="8222100" cy="2710200"/>
-          </a:xfrm>
-          <a:prstGeom prst="rect">
-            <a:avLst/>
-          </a:prstGeom>
+          <p:nvPr/>
+        </p:nvSpPr>
+        <p:spPr>
+          <a:xfrm>
+            <a:off x="384675" y="1868375"/>
+            <a:ext cx="1538700" cy="738600"/>
+          </a:xfrm>
+          <a:prstGeom prst="rect">
+            <a:avLst/>
+          </a:prstGeom>
+          <a:noFill/>
+          <a:ln>
+            <a:noFill/>
+          </a:ln>
         </p:spPr>
         <p:txBody>
           <a:bodyPr anchorCtr="0" anchor="t" bIns="91425" lIns="91425" rIns="91425" tIns="91425">
@@ -7084,55 +8428,23 @@
           </a:bodyPr>
           <a:lstStyle/>
           <a:p>
-            <a:pPr indent="-228600" lvl="0" marL="457200" rtl="0">
-              <a:spcBef>
-                <a:spcPts val="0"/>
-              </a:spcBef>
-            </a:pPr>
-            <a:r>
-              <a:rPr lang="en"/>
-              <a:t>Provides security when communicating over a computer network</a:t>
-            </a:r>
-          </a:p>
-          <a:p>
-            <a:pPr indent="-228600" lvl="0" marL="457200" rtl="0">
-              <a:spcBef>
-                <a:spcPts val="0"/>
-              </a:spcBef>
-            </a:pPr>
-            <a:r>
-              <a:rPr lang="en"/>
-              <a:t>Makes use of public/private key pair encryption to exchange a symmetric key</a:t>
-            </a:r>
-          </a:p>
-          <a:p>
-            <a:pPr indent="-228600" lvl="0" marL="457200" rtl="0">
-              <a:spcBef>
-                <a:spcPts val="0"/>
-              </a:spcBef>
-            </a:pPr>
-            <a:r>
-              <a:rPr lang="en"/>
-              <a:t>Widely used on the web</a:t>
-            </a:r>
-          </a:p>
-          <a:p>
-            <a:pPr indent="-228600" lvl="0" marL="457200">
-              <a:spcBef>
-                <a:spcPts val="0"/>
-              </a:spcBef>
-            </a:pPr>
-            <a:r>
-              <a:rPr lang="en"/>
-              <a:t>Java implementation is </a:t>
-            </a:r>
-            <a:r>
-              <a:rPr b="1" lang="en"/>
-              <a:t>Java Secure Socket Extension</a:t>
-            </a:r>
-            <a:r>
-              <a:rPr lang="en"/>
-              <a:t> (JSSE)</a:t>
+            <a:pPr lvl="0">
+              <a:spcBef>
+                <a:spcPts val="0"/>
+              </a:spcBef>
+              <a:buNone/>
+            </a:pPr>
+            <a:r>
+              <a:rPr lang="en" sz="1800">
+                <a:solidFill>
+                  <a:schemeClr val="lt2"/>
+                </a:solidFill>
+                <a:latin typeface="Roboto"/>
+                <a:ea typeface="Roboto"/>
+                <a:cs typeface="Roboto"/>
+                <a:sym typeface="Roboto"/>
+              </a:rPr>
+              <a:t>Right Now :</a:t>
             </a:r>
           </a:p>
         </p:txBody>
@@ -7153,7 +8465,7 @@
   <p:cSld>
     <p:spTree>
       <p:nvGrpSpPr>
-        <p:cNvPr id="97" name="Shape 97"/>
+        <p:cNvPr id="104" name="Shape 104"/>
         <p:cNvGrpSpPr/>
         <p:nvPr/>
       </p:nvGrpSpPr>
@@ -7167,7 +8479,7 @@
       </p:grpSpPr>
       <p:sp>
         <p:nvSpPr>
-          <p:cNvPr id="98" name="Shape 98"/>
+          <p:cNvPr id="105" name="Shape 105"/>
           <p:cNvSpPr txBox="1"/>
           <p:nvPr>
             <p:ph type="title"/>
@@ -7188,7 +8500,7 @@
           </a:bodyPr>
           <a:lstStyle/>
           <a:p>
-            <a:pPr lvl="0" rtl="0">
+            <a:pPr lvl="0">
               <a:spcBef>
                 <a:spcPts val="0"/>
               </a:spcBef>
@@ -7196,14 +8508,14 @@
             </a:pPr>
             <a:r>
               <a:rPr lang="en"/>
-              <a:t>OpenSSL</a:t>
-            </a:r>
-          </a:p>
-        </p:txBody>
-      </p:sp>
-      <p:sp>
-        <p:nvSpPr>
-          <p:cNvPr id="99" name="Shape 99"/>
+              <a:t>SSL/TLS Protocol</a:t>
+            </a:r>
+          </a:p>
+        </p:txBody>
+      </p:sp>
+      <p:sp>
+        <p:nvSpPr>
+          <p:cNvPr id="106" name="Shape 106"/>
           <p:cNvSpPr txBox="1"/>
           <p:nvPr>
             <p:ph idx="1" type="body"/>
@@ -7231,7 +8543,7 @@
             </a:pPr>
             <a:r>
               <a:rPr lang="en"/>
-              <a:t>Open source implementation of SSL/TLS protocol</a:t>
+              <a:t>Provides security when communicating over a computer network</a:t>
             </a:r>
           </a:p>
           <a:p>
@@ -7242,7 +8554,7 @@
             </a:pPr>
             <a:r>
               <a:rPr lang="en"/>
-              <a:t>Written in C</a:t>
+              <a:t>Makes use of public/private key pair encryption to exchange a symmetric key</a:t>
             </a:r>
           </a:p>
           <a:p>
@@ -7253,18 +8565,26 @@
             </a:pPr>
             <a:r>
               <a:rPr lang="en"/>
-              <a:t>Works on almost all platforms</a:t>
-            </a:r>
-          </a:p>
-          <a:p>
-            <a:pPr indent="-228600" lvl="0" marL="457200" rtl="0">
+              <a:t>Widely used on the web</a:t>
+            </a:r>
+          </a:p>
+          <a:p>
+            <a:pPr indent="-228600" lvl="0" marL="457200">
               <a:spcBef>
                 <a:spcPts val="0"/>
               </a:spcBef>
             </a:pPr>
             <a:r>
               <a:rPr lang="en"/>
-              <a:t>Many vulnerabilities (POODLE, Heartbleed, etc.)</a:t>
+              <a:t>Java implementation is </a:t>
+            </a:r>
+            <a:r>
+              <a:rPr b="1" lang="en"/>
+              <a:t>Java Secure Socket Extension</a:t>
+            </a:r>
+            <a:r>
+              <a:rPr lang="en"/>
+              <a:t> (JSSE)</a:t>
             </a:r>
           </a:p>
         </p:txBody>
@@ -7285,7 +8605,7 @@
   <p:cSld>
     <p:spTree>
       <p:nvGrpSpPr>
-        <p:cNvPr id="103" name="Shape 103"/>
+        <p:cNvPr id="110" name="Shape 110"/>
         <p:cNvGrpSpPr/>
         <p:nvPr/>
       </p:nvGrpSpPr>
@@ -7299,7 +8619,7 @@
       </p:grpSpPr>
       <p:sp>
         <p:nvSpPr>
-          <p:cNvPr id="104" name="Shape 104"/>
+          <p:cNvPr id="111" name="Shape 111"/>
           <p:cNvSpPr txBox="1"/>
           <p:nvPr>
             <p:ph type="title"/>
@@ -7328,14 +8648,14 @@
             </a:pPr>
             <a:r>
               <a:rPr lang="en"/>
-              <a:t>SSL Encryption with Undertow</a:t>
-            </a:r>
-          </a:p>
-        </p:txBody>
-      </p:sp>
-      <p:sp>
-        <p:nvSpPr>
-          <p:cNvPr id="105" name="Shape 105"/>
+              <a:t>OpenSSL</a:t>
+            </a:r>
+          </a:p>
+        </p:txBody>
+      </p:sp>
+      <p:sp>
+        <p:nvSpPr>
+          <p:cNvPr id="112" name="Shape 112"/>
           <p:cNvSpPr txBox="1"/>
           <p:nvPr>
             <p:ph idx="1" type="body"/>
@@ -7363,15 +8683,18 @@
             </a:pPr>
             <a:r>
               <a:rPr lang="en"/>
-              <a:t>Undertow is using </a:t>
-            </a:r>
-            <a:r>
-              <a:rPr b="1" lang="en"/>
-              <a:t>JSSE </a:t>
-            </a:r>
+              <a:t>Open source implementation of SSL/TLS protocol</a:t>
+            </a:r>
+          </a:p>
+          <a:p>
+            <a:pPr indent="-228600" lvl="0" marL="457200" rtl="0">
+              <a:spcBef>
+                <a:spcPts val="0"/>
+              </a:spcBef>
+            </a:pPr>
             <a:r>
               <a:rPr lang="en"/>
-              <a:t>SSL Engine for SSL/TLS  </a:t>
+              <a:t>Written in C</a:t>
             </a:r>
           </a:p>
           <a:p>
@@ -7382,28 +8705,19 @@
             </a:pPr>
             <a:r>
               <a:rPr lang="en"/>
-              <a:t>Some work done to use OpenSSL Engine via </a:t>
-            </a:r>
-            <a:r>
-              <a:rPr b="1" lang="en"/>
-              <a:t>JSSE</a:t>
-            </a:r>
+              <a:t>Works on almost all platforms</a:t>
+            </a:r>
+          </a:p>
+          <a:p>
+            <a:pPr indent="-228600" lvl="0" marL="457200" rtl="0">
+              <a:spcBef>
+                <a:spcPts val="0"/>
+              </a:spcBef>
+            </a:pPr>
             <a:r>
               <a:rPr lang="en"/>
-              <a:t> API (namely sockets)</a:t>
-            </a:r>
-          </a:p>
-          <a:p>
-            <a:pPr lvl="0" rtl="0">
-              <a:spcBef>
-                <a:spcPts val="0"/>
-              </a:spcBef>
-              <a:buNone/>
-            </a:pPr>
-            <a:r>
-              <a:t/>
-            </a:r>
-            <a:endParaRPr/>
+              <a:t>Many vulnerabilities (POODLE, Heartbleed, etc.)</a:t>
+            </a:r>
           </a:p>
         </p:txBody>
       </p:sp>
@@ -7423,7 +8737,7 @@
   <p:cSld>
     <p:spTree>
       <p:nvGrpSpPr>
-        <p:cNvPr id="109" name="Shape 109"/>
+        <p:cNvPr id="116" name="Shape 116"/>
         <p:cNvGrpSpPr/>
         <p:nvPr/>
       </p:nvGrpSpPr>
@@ -7437,7 +8751,7 @@
       </p:grpSpPr>
       <p:sp>
         <p:nvSpPr>
-          <p:cNvPr id="110" name="Shape 110"/>
+          <p:cNvPr id="117" name="Shape 117"/>
           <p:cNvSpPr txBox="1"/>
           <p:nvPr>
             <p:ph type="title"/>
@@ -7466,14 +8780,14 @@
             </a:pPr>
             <a:r>
               <a:rPr lang="en"/>
-              <a:t>Project Goals (1)</a:t>
-            </a:r>
-          </a:p>
-        </p:txBody>
-      </p:sp>
-      <p:sp>
-        <p:nvSpPr>
-          <p:cNvPr id="111" name="Shape 111"/>
+              <a:t>SSL Encryption with Undertow</a:t>
+            </a:r>
+          </a:p>
+        </p:txBody>
+      </p:sp>
+      <p:sp>
+        <p:nvSpPr>
+          <p:cNvPr id="118" name="Shape 118"/>
           <p:cNvSpPr txBox="1"/>
           <p:nvPr>
             <p:ph idx="1" type="body"/>
@@ -7494,6 +8808,44 @@
           </a:bodyPr>
           <a:lstStyle/>
           <a:p>
+            <a:pPr indent="-228600" lvl="0" marL="457200" rtl="0">
+              <a:spcBef>
+                <a:spcPts val="0"/>
+              </a:spcBef>
+            </a:pPr>
+            <a:r>
+              <a:rPr lang="en"/>
+              <a:t>Undertow is using </a:t>
+            </a:r>
+            <a:r>
+              <a:rPr b="1" lang="en"/>
+              <a:t>JSSE </a:t>
+            </a:r>
+            <a:r>
+              <a:rPr lang="en"/>
+              <a:t>SSL Engine for SSL/TLS  </a:t>
+            </a:r>
+          </a:p>
+          <a:p>
+            <a:pPr indent="-228600" lvl="0" marL="457200" rtl="0">
+              <a:spcBef>
+                <a:spcPts val="0"/>
+              </a:spcBef>
+            </a:pPr>
+            <a:r>
+              <a:rPr lang="en"/>
+              <a:t>Some work done to use OpenSSL Engine via </a:t>
+            </a:r>
+            <a:r>
+              <a:rPr b="1" lang="en"/>
+              <a:t>JSSE</a:t>
+            </a:r>
+            <a:r>
+              <a:rPr lang="en"/>
+              <a:t> API (namely sockets)</a:t>
+            </a:r>
+          </a:p>
+          <a:p>
             <a:pPr lvl="0" rtl="0">
               <a:spcBef>
                 <a:spcPts val="0"/>
@@ -7501,79 +8853,9 @@
               <a:buNone/>
             </a:pPr>
             <a:r>
-              <a:rPr lang="en"/>
-              <a:t>Modify Tomcat Native</a:t>
-            </a:r>
-          </a:p>
-          <a:p>
-            <a:pPr lvl="0" rtl="0">
-              <a:spcBef>
-                <a:spcPts val="0"/>
-              </a:spcBef>
-              <a:buNone/>
-            </a:pPr>
-            <a:r>
-              <a:rPr lang="en"/>
-              <a:t>This means :</a:t>
-            </a:r>
-          </a:p>
-          <a:p>
-            <a:pPr indent="-228600" lvl="0" marL="914400" rtl="0">
-              <a:spcBef>
-                <a:spcPts val="0"/>
-              </a:spcBef>
-            </a:pPr>
-            <a:r>
-              <a:rPr lang="en"/>
-              <a:t>Study Tomcat Native, Undertow and the current OpenSSL experiments for Undertow</a:t>
-            </a:r>
-          </a:p>
-          <a:p>
-            <a:pPr indent="-228600" lvl="0" marL="914400" rtl="0">
-              <a:spcBef>
-                <a:spcPts val="0"/>
-              </a:spcBef>
-              <a:buClr>
-                <a:srgbClr val="FF0000"/>
-              </a:buClr>
-            </a:pPr>
-            <a:r>
-              <a:rPr lang="en">
-                <a:solidFill>
-                  <a:srgbClr val="FF0000"/>
-                </a:solidFill>
-              </a:rPr>
-              <a:t>Remove APR code used to load OpenSSL in Tomcat Native</a:t>
-            </a:r>
-          </a:p>
-          <a:p>
-            <a:pPr indent="-228600" lvl="0" marL="914400" rtl="0">
-              <a:spcBef>
-                <a:spcPts val="0"/>
-              </a:spcBef>
-              <a:buClr>
-                <a:srgbClr val="FF0000"/>
-              </a:buClr>
-            </a:pPr>
-            <a:r>
-              <a:rPr lang="en">
-                <a:solidFill>
-                  <a:srgbClr val="FF0000"/>
-                </a:solidFill>
-              </a:rPr>
-              <a:t>Abstracts Tomcat Native so that it can also be used in Undertow instead of JSSE</a:t>
-            </a:r>
-          </a:p>
-          <a:p>
-            <a:pPr indent="-228600" lvl="0" marL="914400" rtl="0">
-              <a:spcBef>
-                <a:spcPts val="0"/>
-              </a:spcBef>
-            </a:pPr>
-            <a:r>
-              <a:rPr lang="en"/>
-              <a:t>Run benchmarks to measure performance</a:t>
-            </a:r>
+              <a:t/>
+            </a:r>
+            <a:endParaRPr/>
           </a:p>
         </p:txBody>
       </p:sp>
@@ -7593,7 +8875,7 @@
   <p:cSld>
     <p:spTree>
       <p:nvGrpSpPr>
-        <p:cNvPr id="115" name="Shape 115"/>
+        <p:cNvPr id="122" name="Shape 122"/>
         <p:cNvGrpSpPr/>
         <p:nvPr/>
       </p:nvGrpSpPr>
@@ -7607,7 +8889,7 @@
       </p:grpSpPr>
       <p:sp>
         <p:nvSpPr>
-          <p:cNvPr id="116" name="Shape 116"/>
+          <p:cNvPr id="123" name="Shape 123"/>
           <p:cNvSpPr txBox="1"/>
           <p:nvPr>
             <p:ph type="title"/>
@@ -7636,14 +8918,14 @@
             </a:pPr>
             <a:r>
               <a:rPr lang="en"/>
-              <a:t>Project Goals (2)</a:t>
-            </a:r>
-          </a:p>
-        </p:txBody>
-      </p:sp>
-      <p:sp>
-        <p:nvSpPr>
-          <p:cNvPr id="117" name="Shape 117"/>
+              <a:t>Project Goals (1)</a:t>
+            </a:r>
+          </a:p>
+        </p:txBody>
+      </p:sp>
+      <p:sp>
+        <p:nvSpPr>
+          <p:cNvPr id="124" name="Shape 124"/>
           <p:cNvSpPr txBox="1"/>
           <p:nvPr>
             <p:ph idx="1" type="body"/>
@@ -7664,194 +8946,74 @@
           </a:bodyPr>
           <a:lstStyle/>
           <a:p>
-            <a:pPr lvl="0" rtl="0">
-              <a:spcBef>
-                <a:spcPts val="0"/>
-              </a:spcBef>
-              <a:buNone/>
-            </a:pPr>
-            <a:r>
-              <a:rPr lang="en">
-                <a:solidFill>
-                  <a:srgbClr val="FF0000"/>
-                </a:solidFill>
-              </a:rPr>
-              <a:t>&lt;TODO DIAGRAM&gt;</a:t>
-            </a:r>
-          </a:p>
-        </p:txBody>
-      </p:sp>
-      <p:sp>
-        <p:nvSpPr>
-          <p:cNvPr id="118" name="Shape 118"/>
-          <p:cNvSpPr txBox="1"/>
-          <p:nvPr>
-            <p:ph type="title"/>
-          </p:nvPr>
-        </p:nvSpPr>
-        <p:spPr>
-          <a:xfrm>
-            <a:off x="4963050" y="1805627"/>
-            <a:ext cx="3128400" cy="660300"/>
-          </a:xfrm>
-          <a:prstGeom prst="rect">
-            <a:avLst/>
-          </a:prstGeom>
-          <a:solidFill>
-            <a:schemeClr val="accent5"/>
-          </a:solidFill>
-        </p:spPr>
-        <p:txBody>
-          <a:bodyPr anchorCtr="0" anchor="ctr" bIns="91425" lIns="91425" rIns="91425" tIns="91425">
-            <a:noAutofit/>
-          </a:bodyPr>
-          <a:lstStyle/>
-          <a:p>
-            <a:pPr lvl="0" rtl="0" algn="ctr">
-              <a:spcBef>
-                <a:spcPts val="0"/>
-              </a:spcBef>
-              <a:buNone/>
+            <a:pPr indent="-228600" lvl="0" marL="457200" rtl="0">
+              <a:spcBef>
+                <a:spcPts val="0"/>
+              </a:spcBef>
             </a:pPr>
             <a:r>
               <a:rPr lang="en"/>
-              <a:t>TODO</a:t>
-            </a:r>
-          </a:p>
-        </p:txBody>
-      </p:sp>
-      <p:cxnSp>
-        <p:nvCxnSpPr>
-          <p:cNvPr id="119" name="Shape 119"/>
-          <p:cNvCxnSpPr>
-            <a:stCxn id="118" idx="2"/>
-            <a:endCxn id="120" idx="0"/>
-          </p:cNvCxnSpPr>
-          <p:nvPr/>
-        </p:nvCxnSpPr>
-        <p:spPr>
-          <a:xfrm>
-            <a:off x="6527250" y="2465927"/>
-            <a:ext cx="0" cy="421500"/>
-          </a:xfrm>
-          <a:prstGeom prst="straightConnector1">
-            <a:avLst/>
-          </a:prstGeom>
-          <a:noFill/>
-          <a:ln cap="flat" cmpd="sng" w="9525">
-            <a:solidFill>
-              <a:schemeClr val="dk2"/>
-            </a:solidFill>
-            <a:prstDash val="solid"/>
-            <a:round/>
-            <a:headEnd len="lg" w="lg" type="none"/>
-            <a:tailEnd len="lg" w="lg" type="none"/>
-          </a:ln>
-        </p:spPr>
-      </p:cxnSp>
-      <p:sp>
-        <p:nvSpPr>
-          <p:cNvPr id="120" name="Shape 120"/>
-          <p:cNvSpPr txBox="1"/>
-          <p:nvPr>
-            <p:ph type="title"/>
-          </p:nvPr>
-        </p:nvSpPr>
-        <p:spPr>
-          <a:xfrm>
-            <a:off x="4963050" y="2887377"/>
-            <a:ext cx="3128400" cy="660300"/>
-          </a:xfrm>
-          <a:prstGeom prst="rect">
-            <a:avLst/>
-          </a:prstGeom>
-          <a:solidFill>
-            <a:schemeClr val="dk1"/>
-          </a:solidFill>
-        </p:spPr>
-        <p:txBody>
-          <a:bodyPr anchorCtr="0" anchor="ctr" bIns="91425" lIns="91425" rIns="91425" tIns="91425">
-            <a:noAutofit/>
-          </a:bodyPr>
-          <a:lstStyle/>
-          <a:p>
-            <a:pPr lvl="0" rtl="0" algn="ctr">
-              <a:spcBef>
-                <a:spcPts val="0"/>
-              </a:spcBef>
-              <a:buNone/>
+              <a:t>Study Tomcat Native, Undertow and the current OpenSSL experiments for Undertow</a:t>
+            </a:r>
+          </a:p>
+          <a:p>
+            <a:pPr indent="-228600" lvl="0" marL="457200" rtl="0">
+              <a:spcBef>
+                <a:spcPts val="0"/>
+              </a:spcBef>
             </a:pPr>
             <a:r>
               <a:rPr lang="en"/>
-              <a:t>TODO</a:t>
-            </a:r>
-          </a:p>
-        </p:txBody>
-      </p:sp>
-      <p:cxnSp>
-        <p:nvCxnSpPr>
-          <p:cNvPr id="121" name="Shape 121"/>
-          <p:cNvCxnSpPr>
-            <a:stCxn id="120" idx="2"/>
-            <a:endCxn id="122" idx="0"/>
-          </p:cNvCxnSpPr>
-          <p:nvPr/>
-        </p:nvCxnSpPr>
-        <p:spPr>
-          <a:xfrm>
-            <a:off x="6527250" y="3547677"/>
-            <a:ext cx="0" cy="421500"/>
-          </a:xfrm>
-          <a:prstGeom prst="straightConnector1">
-            <a:avLst/>
-          </a:prstGeom>
-          <a:noFill/>
-          <a:ln cap="flat" cmpd="sng" w="9525">
-            <a:solidFill>
-              <a:schemeClr val="dk2"/>
-            </a:solidFill>
-            <a:prstDash val="solid"/>
-            <a:round/>
-            <a:headEnd len="lg" w="lg" type="none"/>
-            <a:tailEnd len="lg" w="lg" type="none"/>
-          </a:ln>
-        </p:spPr>
-      </p:cxnSp>
-      <p:sp>
-        <p:nvSpPr>
-          <p:cNvPr id="122" name="Shape 122"/>
-          <p:cNvSpPr txBox="1"/>
-          <p:nvPr>
-            <p:ph type="title"/>
-          </p:nvPr>
-        </p:nvSpPr>
-        <p:spPr>
-          <a:xfrm>
-            <a:off x="4963051" y="3969096"/>
-            <a:ext cx="3128399" cy="660300"/>
-          </a:xfrm>
-          <a:prstGeom prst="rect">
-            <a:avLst/>
-          </a:prstGeom>
-          <a:solidFill>
-            <a:schemeClr val="accent1"/>
-          </a:solidFill>
-        </p:spPr>
-        <p:txBody>
-          <a:bodyPr anchorCtr="0" anchor="ctr" bIns="91425" lIns="91425" rIns="91425" tIns="91425">
-            <a:noAutofit/>
-          </a:bodyPr>
-          <a:lstStyle/>
-          <a:p>
-            <a:pPr lvl="0" rtl="0" algn="ctr">
-              <a:spcBef>
-                <a:spcPts val="0"/>
-              </a:spcBef>
-              <a:buNone/>
+              <a:t>Subset Tomcat Native so that the JNI interfaces focus on OpenSSL</a:t>
+            </a:r>
+          </a:p>
+          <a:p>
+            <a:pPr indent="-228600" lvl="0" marL="457200" rtl="0">
+              <a:spcBef>
+                <a:spcPts val="0"/>
+              </a:spcBef>
             </a:pPr>
             <a:r>
               <a:rPr lang="en"/>
-              <a:t>TODO</a:t>
+              <a:t>Abstracts Tomcat Native so that it can also be used in </a:t>
+            </a:r>
+            <a:r>
+              <a:rPr b="1" lang="en"/>
+              <a:t>Undertow</a:t>
+            </a:r>
+            <a:r>
+              <a:rPr lang="en"/>
+              <a:t> and </a:t>
+            </a:r>
+            <a:r>
+              <a:rPr b="1" lang="en"/>
+              <a:t>Tomcat</a:t>
+            </a:r>
+            <a:r>
+              <a:rPr lang="en"/>
+              <a:t> instead of JSSE</a:t>
+            </a:r>
+          </a:p>
+          <a:p>
+            <a:pPr indent="-228600" lvl="0" marL="457200" rtl="0">
+              <a:spcBef>
+                <a:spcPts val="0"/>
+              </a:spcBef>
+            </a:pPr>
+            <a:r>
+              <a:rPr lang="en"/>
+              <a:t>Run benchmarks to measure performance</a:t>
+            </a:r>
+          </a:p>
+          <a:p>
+            <a:pPr indent="-228600" lvl="0" marL="457200" rtl="0">
+              <a:spcBef>
+                <a:spcPts val="0"/>
+              </a:spcBef>
+            </a:pPr>
+            <a:r>
+              <a:rPr lang="en"/>
+              <a:t>Add JNI calls to access more OpenSSL features (depending on time)</a:t>
             </a:r>
           </a:p>
         </p:txBody>

</xml_diff>